<commit_message>
Added basic scripts for model comparison and regression
</commit_message>
<xml_diff>
--- a/version2/slides/intro-sci.pptx
+++ b/version2/slides/intro-sci.pptx
@@ -318,7 +318,7 @@
           <a:p>
             <a:fld id="{5091855A-294E-431A-9859-2765F2241587}" type="datetimeFigureOut">
               <a:rPr lang="en-US" smtClean="0"/>
-              <a:t>4/28/2025</a:t>
+              <a:t>4/29/2025</a:t>
             </a:fld>
             <a:endParaRPr lang="en-US"/>
           </a:p>
@@ -3467,7 +3467,7 @@
           <a:p>
             <a:fld id="{5198BA7A-2DC7-4E80-BC43-C2127F15823C}" type="datetime1">
               <a:rPr lang="de-DE" smtClean="0"/>
-              <a:t>28.04.2025</a:t>
+              <a:t>29.04.2025</a:t>
             </a:fld>
             <a:endParaRPr lang="en-US"/>
           </a:p>
@@ -3668,7 +3668,7 @@
           <a:p>
             <a:fld id="{EF4F5A0B-ACD0-49D0-A6FA-765A96ED9790}" type="datetime1">
               <a:rPr lang="de-DE" smtClean="0"/>
-              <a:t>28.04.2025</a:t>
+              <a:t>29.04.2025</a:t>
             </a:fld>
             <a:endParaRPr lang="en-US"/>
           </a:p>
@@ -3879,7 +3879,7 @@
           <a:p>
             <a:fld id="{13BE6F7B-86A9-4494-A63D-9BD62DED037F}" type="datetime1">
               <a:rPr lang="de-DE" smtClean="0"/>
-              <a:t>28.04.2025</a:t>
+              <a:t>29.04.2025</a:t>
             </a:fld>
             <a:endParaRPr lang="en-US"/>
           </a:p>
@@ -4080,7 +4080,7 @@
           <a:p>
             <a:fld id="{403A2FDA-9B6F-4F19-BB52-15CB2FEB03DD}" type="datetime1">
               <a:rPr lang="de-DE" smtClean="0"/>
-              <a:t>28.04.2025</a:t>
+              <a:t>29.04.2025</a:t>
             </a:fld>
             <a:endParaRPr lang="en-US"/>
           </a:p>
@@ -4358,7 +4358,7 @@
           <a:p>
             <a:fld id="{B1F82A23-AB26-4EA9-9EE4-DB6F9A4796C6}" type="datetime1">
               <a:rPr lang="de-DE" smtClean="0"/>
-              <a:t>28.04.2025</a:t>
+              <a:t>29.04.2025</a:t>
             </a:fld>
             <a:endParaRPr lang="en-US"/>
           </a:p>
@@ -4626,7 +4626,7 @@
           <a:p>
             <a:fld id="{B816018A-B6F3-4669-A60E-275EFC10913D}" type="datetime1">
               <a:rPr lang="de-DE" smtClean="0"/>
-              <a:t>28.04.2025</a:t>
+              <a:t>29.04.2025</a:t>
             </a:fld>
             <a:endParaRPr lang="en-US"/>
           </a:p>
@@ -5041,7 +5041,7 @@
           <a:p>
             <a:fld id="{75E1AE47-15F0-44ED-9082-02430EE1862C}" type="datetime1">
               <a:rPr lang="de-DE" smtClean="0"/>
-              <a:t>28.04.2025</a:t>
+              <a:t>29.04.2025</a:t>
             </a:fld>
             <a:endParaRPr lang="en-US"/>
           </a:p>
@@ -5185,7 +5185,7 @@
           <a:p>
             <a:fld id="{457028B1-AFAA-4D64-87CF-80928E3C88A7}" type="datetime1">
               <a:rPr lang="de-DE" smtClean="0"/>
-              <a:t>28.04.2025</a:t>
+              <a:t>29.04.2025</a:t>
             </a:fld>
             <a:endParaRPr lang="en-US"/>
           </a:p>
@@ -5301,7 +5301,7 @@
           <a:p>
             <a:fld id="{D1DE4F98-DA4D-46C7-974A-FF93C09B0FD4}" type="datetime1">
               <a:rPr lang="de-DE" smtClean="0"/>
-              <a:t>28.04.2025</a:t>
+              <a:t>29.04.2025</a:t>
             </a:fld>
             <a:endParaRPr lang="en-US"/>
           </a:p>
@@ -5615,7 +5615,7 @@
           <a:p>
             <a:fld id="{67FB4E4C-5EC5-4821-A2DA-37F62D6F819F}" type="datetime1">
               <a:rPr lang="de-DE" smtClean="0"/>
-              <a:t>28.04.2025</a:t>
+              <a:t>29.04.2025</a:t>
             </a:fld>
             <a:endParaRPr lang="en-US"/>
           </a:p>
@@ -5906,7 +5906,7 @@
           <a:p>
             <a:fld id="{72DA2E5A-7DC6-4BD8-9258-B12FA935CEBC}" type="datetime1">
               <a:rPr lang="de-DE" smtClean="0"/>
-              <a:t>28.04.2025</a:t>
+              <a:t>29.04.2025</a:t>
             </a:fld>
             <a:endParaRPr lang="en-US"/>
           </a:p>
@@ -6150,7 +6150,7 @@
           <a:p>
             <a:fld id="{FD3ED238-00C2-4FF9-B84E-244465BBE055}" type="datetime1">
               <a:rPr lang="de-DE" smtClean="0"/>
-              <a:t>28.04.2025</a:t>
+              <a:t>29.04.2025</a:t>
             </a:fld>
             <a:endParaRPr lang="en-US"/>
           </a:p>
@@ -7213,7 +7213,7 @@
           <a:p>
             <a:fld id="{B1F82A23-AB26-4EA9-9EE4-DB6F9A4796C6}" type="datetime1">
               <a:rPr lang="de-DE" smtClean="0"/>
-              <a:t>28.04.2025</a:t>
+              <a:t>29.04.2025</a:t>
             </a:fld>
             <a:endParaRPr lang="en-US"/>
           </a:p>
@@ -7431,7 +7431,7 @@
           <a:p>
             <a:fld id="{403A2FDA-9B6F-4F19-BB52-15CB2FEB03DD}" type="datetime1">
               <a:rPr lang="de-DE" smtClean="0"/>
-              <a:t>28.04.2025</a:t>
+              <a:t>29.04.2025</a:t>
             </a:fld>
             <a:endParaRPr lang="en-US"/>
           </a:p>
@@ -9466,7 +9466,7 @@
           <a:p>
             <a:fld id="{403A2FDA-9B6F-4F19-BB52-15CB2FEB03DD}" type="datetime1">
               <a:rPr lang="de-DE" smtClean="0"/>
-              <a:t>28.04.2025</a:t>
+              <a:t>29.04.2025</a:t>
             </a:fld>
             <a:endParaRPr lang="en-US"/>
           </a:p>
@@ -10895,7 +10895,7 @@
           <a:p>
             <a:fld id="{403A2FDA-9B6F-4F19-BB52-15CB2FEB03DD}" type="datetime1">
               <a:rPr lang="de-DE" smtClean="0"/>
-              <a:t>28.04.2025</a:t>
+              <a:t>29.04.2025</a:t>
             </a:fld>
             <a:endParaRPr lang="en-US"/>
           </a:p>
@@ -11464,8 +11464,8 @@
           </mc:Fallback>
         </mc:AlternateContent>
       </p:grpSp>
-      <mc:AlternateContent xmlns:mc="http://schemas.openxmlformats.org/markup-compatibility/2006" xmlns:a14="http://schemas.microsoft.com/office/drawing/2010/main">
-        <mc:Choice Requires="a14">
+      <mc:AlternateContent xmlns:mc="http://schemas.openxmlformats.org/markup-compatibility/2006">
+        <mc:Choice xmlns:a14="http://schemas.microsoft.com/office/drawing/2010/main" Requires="a14">
           <p:sp>
             <p:nvSpPr>
               <p:cNvPr id="19" name="TextBox 18">
@@ -11480,7 +11480,7 @@
             </p:nvSpPr>
             <p:spPr>
               <a:xfrm>
-                <a:off x="8526173" y="3650593"/>
+                <a:off x="8526173" y="3650592"/>
                 <a:ext cx="547689" cy="307777"/>
               </a:xfrm>
               <a:prstGeom prst="rect">
@@ -11515,7 +11515,7 @@
             </p:txBody>
           </p:sp>
         </mc:Choice>
-        <mc:Fallback xmlns="">
+        <mc:Fallback>
           <p:sp>
             <p:nvSpPr>
               <p:cNvPr id="19" name="TextBox 18">
@@ -11532,7 +11532,7 @@
             </p:nvSpPr>
             <p:spPr>
               <a:xfrm>
-                <a:off x="8526173" y="3650593"/>
+                <a:off x="8526173" y="3650592"/>
                 <a:ext cx="547689" cy="307777"/>
               </a:xfrm>
               <a:prstGeom prst="rect">
@@ -11550,7 +11550,7 @@
               <a:lstStyle/>
               <a:p>
                 <a:r>
-                  <a:rPr lang="en-US">
+                  <a:rPr lang="en-SE">
                     <a:noFill/>
                   </a:rPr>
                   <a:t> </a:t>
@@ -11729,8 +11729,8 @@
         </p:nvCxnSpPr>
         <p:spPr>
           <a:xfrm flipV="1">
-            <a:off x="8422755" y="3958370"/>
-            <a:ext cx="377263" cy="510896"/>
+            <a:off x="8422755" y="3958369"/>
+            <a:ext cx="377263" cy="510897"/>
           </a:xfrm>
           <a:prstGeom prst="curvedConnector2">
             <a:avLst/>
@@ -11754,6 +11754,110 @@
           </a:fontRef>
         </p:style>
       </p:cxnSp>
+      <p:sp>
+        <p:nvSpPr>
+          <p:cNvPr id="3" name="Oval 2">
+            <a:extLst>
+              <a:ext uri="{FF2B5EF4-FFF2-40B4-BE49-F238E27FC236}">
+                <a16:creationId xmlns:a16="http://schemas.microsoft.com/office/drawing/2014/main" id="{B12A6769-8627-F5F5-C361-919684B87A79}"/>
+              </a:ext>
+            </a:extLst>
+          </p:cNvPr>
+          <p:cNvSpPr/>
+          <p:nvPr/>
+        </p:nvSpPr>
+        <p:spPr>
+          <a:xfrm>
+            <a:off x="8610600" y="3609000"/>
+            <a:ext cx="360000" cy="369326"/>
+          </a:xfrm>
+          <a:prstGeom prst="ellipse">
+            <a:avLst/>
+          </a:prstGeom>
+          <a:noFill/>
+          <a:ln>
+            <a:solidFill>
+              <a:srgbClr val="7030A0"/>
+            </a:solidFill>
+          </a:ln>
+        </p:spPr>
+        <p:style>
+          <a:lnRef idx="2">
+            <a:schemeClr val="accent1">
+              <a:shade val="15000"/>
+            </a:schemeClr>
+          </a:lnRef>
+          <a:fillRef idx="1">
+            <a:schemeClr val="accent1"/>
+          </a:fillRef>
+          <a:effectRef idx="0">
+            <a:schemeClr val="accent1"/>
+          </a:effectRef>
+          <a:fontRef idx="minor">
+            <a:schemeClr val="lt1"/>
+          </a:fontRef>
+        </p:style>
+        <p:txBody>
+          <a:bodyPr rtlCol="0" anchor="ctr"/>
+          <a:lstStyle/>
+          <a:p>
+            <a:pPr algn="ctr"/>
+            <a:endParaRPr lang="en-SE"/>
+          </a:p>
+        </p:txBody>
+      </p:sp>
+      <p:sp>
+        <p:nvSpPr>
+          <p:cNvPr id="8" name="Oval 7">
+            <a:extLst>
+              <a:ext uri="{FF2B5EF4-FFF2-40B4-BE49-F238E27FC236}">
+                <a16:creationId xmlns:a16="http://schemas.microsoft.com/office/drawing/2014/main" id="{0EB44B6B-C6C0-9BF3-8737-10441B95DF72}"/>
+              </a:ext>
+            </a:extLst>
+          </p:cNvPr>
+          <p:cNvSpPr/>
+          <p:nvPr/>
+        </p:nvSpPr>
+        <p:spPr>
+          <a:xfrm>
+            <a:off x="4503420" y="3844491"/>
+            <a:ext cx="360000" cy="369326"/>
+          </a:xfrm>
+          <a:prstGeom prst="ellipse">
+            <a:avLst/>
+          </a:prstGeom>
+          <a:noFill/>
+          <a:ln>
+            <a:solidFill>
+              <a:srgbClr val="7030A0"/>
+            </a:solidFill>
+          </a:ln>
+        </p:spPr>
+        <p:style>
+          <a:lnRef idx="2">
+            <a:schemeClr val="accent1">
+              <a:shade val="15000"/>
+            </a:schemeClr>
+          </a:lnRef>
+          <a:fillRef idx="1">
+            <a:schemeClr val="accent1"/>
+          </a:fillRef>
+          <a:effectRef idx="0">
+            <a:schemeClr val="accent1"/>
+          </a:effectRef>
+          <a:fontRef idx="minor">
+            <a:schemeClr val="lt1"/>
+          </a:fontRef>
+        </p:style>
+        <p:txBody>
+          <a:bodyPr rtlCol="0" anchor="ctr"/>
+          <a:lstStyle/>
+          <a:p>
+            <a:pPr algn="ctr"/>
+            <a:endParaRPr lang="en-SE"/>
+          </a:p>
+        </p:txBody>
+      </p:sp>
     </p:spTree>
     <p:extLst>
       <p:ext uri="{BB962C8B-B14F-4D97-AF65-F5344CB8AC3E}">
@@ -11835,7 +11939,7 @@
           <a:p>
             <a:fld id="{403A2FDA-9B6F-4F19-BB52-15CB2FEB03DD}" type="datetime1">
               <a:rPr lang="de-DE" smtClean="0"/>
-              <a:t>28.04.2025</a:t>
+              <a:t>29.04.2025</a:t>
             </a:fld>
             <a:endParaRPr lang="en-US"/>
           </a:p>
@@ -13132,7 +13236,7 @@
           <a:p>
             <a:fld id="{403A2FDA-9B6F-4F19-BB52-15CB2FEB03DD}" type="datetime1">
               <a:rPr lang="de-DE" smtClean="0"/>
-              <a:t>28.04.2025</a:t>
+              <a:t>29.04.2025</a:t>
             </a:fld>
             <a:endParaRPr lang="en-US"/>
           </a:p>
@@ -14196,8 +14300,8 @@
           </a:fontRef>
         </p:style>
       </p:cxnSp>
-      <mc:AlternateContent xmlns:mc="http://schemas.openxmlformats.org/markup-compatibility/2006">
-        <mc:Choice xmlns:a14="http://schemas.microsoft.com/office/drawing/2010/main" Requires="a14">
+      <mc:AlternateContent xmlns:mc="http://schemas.openxmlformats.org/markup-compatibility/2006" xmlns:a14="http://schemas.microsoft.com/office/drawing/2010/main">
+        <mc:Choice Requires="a14">
           <p:sp>
             <p:nvSpPr>
               <p:cNvPr id="34" name="TextBox 33">
@@ -14283,7 +14387,7 @@
             </p:txBody>
           </p:sp>
         </mc:Choice>
-        <mc:Fallback>
+        <mc:Fallback xmlns="">
           <p:sp>
             <p:nvSpPr>
               <p:cNvPr id="34" name="TextBox 33">
@@ -14543,34 +14647,6 @@
       </p:sp>
       <p:sp>
         <p:nvSpPr>
-          <p:cNvPr id="3" name="Content Placeholder 2">
-            <a:extLst>
-              <a:ext uri="{FF2B5EF4-FFF2-40B4-BE49-F238E27FC236}">
-                <a16:creationId xmlns:a16="http://schemas.microsoft.com/office/drawing/2014/main" id="{116E2723-508A-E6BA-43AC-4A01FE368918}"/>
-              </a:ext>
-            </a:extLst>
-          </p:cNvPr>
-          <p:cNvSpPr>
-            <a:spLocks noGrp="1"/>
-          </p:cNvSpPr>
-          <p:nvPr>
-            <p:ph idx="1"/>
-          </p:nvPr>
-        </p:nvSpPr>
-        <p:spPr/>
-        <p:txBody>
-          <a:bodyPr/>
-          <a:lstStyle/>
-          <a:p>
-            <a:pPr marL="0" indent="0">
-              <a:buNone/>
-            </a:pPr>
-            <a:endParaRPr lang="sv-SE" dirty="0"/>
-          </a:p>
-        </p:txBody>
-      </p:sp>
-      <p:sp>
-        <p:nvSpPr>
           <p:cNvPr id="4" name="Date Placeholder 3">
             <a:extLst>
               <a:ext uri="{FF2B5EF4-FFF2-40B4-BE49-F238E27FC236}">
@@ -14592,7 +14668,7 @@
           <a:p>
             <a:fld id="{403A2FDA-9B6F-4F19-BB52-15CB2FEB03DD}" type="datetime1">
               <a:rPr lang="de-DE" smtClean="0"/>
-              <a:t>28.04.2025</a:t>
+              <a:t>29.04.2025</a:t>
             </a:fld>
             <a:endParaRPr lang="en-US"/>
           </a:p>
@@ -14655,6 +14731,1557 @@
           </a:p>
         </p:txBody>
       </p:sp>
+      <p:grpSp>
+        <p:nvGrpSpPr>
+          <p:cNvPr id="7" name="Group 6">
+            <a:extLst>
+              <a:ext uri="{FF2B5EF4-FFF2-40B4-BE49-F238E27FC236}">
+                <a16:creationId xmlns:a16="http://schemas.microsoft.com/office/drawing/2014/main" id="{EFD41D1F-7602-7F07-35E0-1934F853A35E}"/>
+              </a:ext>
+            </a:extLst>
+          </p:cNvPr>
+          <p:cNvGrpSpPr/>
+          <p:nvPr/>
+        </p:nvGrpSpPr>
+        <p:grpSpPr>
+          <a:xfrm>
+            <a:off x="838200" y="1660056"/>
+            <a:ext cx="2403652" cy="1794076"/>
+            <a:chOff x="4894174" y="3429000"/>
+            <a:chExt cx="2403652" cy="1794076"/>
+          </a:xfrm>
+        </p:grpSpPr>
+        <p:grpSp>
+          <p:nvGrpSpPr>
+            <p:cNvPr id="8" name="Group 7">
+              <a:extLst>
+                <a:ext uri="{FF2B5EF4-FFF2-40B4-BE49-F238E27FC236}">
+                  <a16:creationId xmlns:a16="http://schemas.microsoft.com/office/drawing/2014/main" id="{8F2F7E76-127D-D9A7-51FC-5ED2FD74E8BD}"/>
+                </a:ext>
+              </a:extLst>
+            </p:cNvPr>
+            <p:cNvGrpSpPr/>
+            <p:nvPr/>
+          </p:nvGrpSpPr>
+          <p:grpSpPr>
+            <a:xfrm>
+              <a:off x="5556000" y="3429000"/>
+              <a:ext cx="1080000" cy="1080000"/>
+              <a:chOff x="3313786" y="3686861"/>
+              <a:chExt cx="1080000" cy="1080000"/>
+            </a:xfrm>
+          </p:grpSpPr>
+          <p:sp>
+            <p:nvSpPr>
+              <p:cNvPr id="10" name="Oval 9">
+                <a:extLst>
+                  <a:ext uri="{FF2B5EF4-FFF2-40B4-BE49-F238E27FC236}">
+                    <a16:creationId xmlns:a16="http://schemas.microsoft.com/office/drawing/2014/main" id="{BDC5E22F-7AFF-5652-0A6A-3B6679FF954A}"/>
+                  </a:ext>
+                </a:extLst>
+              </p:cNvPr>
+              <p:cNvSpPr/>
+              <p:nvPr/>
+            </p:nvSpPr>
+            <p:spPr>
+              <a:xfrm>
+                <a:off x="3313786" y="3686861"/>
+                <a:ext cx="1080000" cy="1080000"/>
+              </a:xfrm>
+              <a:prstGeom prst="ellipse">
+                <a:avLst/>
+              </a:prstGeom>
+              <a:solidFill>
+                <a:schemeClr val="accent1">
+                  <a:lumMod val="50000"/>
+                </a:schemeClr>
+              </a:solidFill>
+              <a:ln>
+                <a:noFill/>
+              </a:ln>
+              <a:effectLst>
+                <a:outerShdw blurRad="50800" dist="38100" dir="2700000" algn="tl" rotWithShape="0">
+                  <a:prstClr val="black">
+                    <a:alpha val="40000"/>
+                  </a:prstClr>
+                </a:outerShdw>
+              </a:effectLst>
+            </p:spPr>
+            <p:style>
+              <a:lnRef idx="2">
+                <a:schemeClr val="accent1">
+                  <a:shade val="15000"/>
+                </a:schemeClr>
+              </a:lnRef>
+              <a:fillRef idx="1">
+                <a:schemeClr val="accent1"/>
+              </a:fillRef>
+              <a:effectRef idx="0">
+                <a:schemeClr val="accent1"/>
+              </a:effectRef>
+              <a:fontRef idx="minor">
+                <a:schemeClr val="lt1"/>
+              </a:fontRef>
+            </p:style>
+            <p:txBody>
+              <a:bodyPr rtlCol="0" anchor="ctr"/>
+              <a:lstStyle/>
+              <a:p>
+                <a:pPr algn="ctr"/>
+                <a:endParaRPr lang="en-US"/>
+              </a:p>
+            </p:txBody>
+          </p:sp>
+          <p:pic>
+            <p:nvPicPr>
+              <p:cNvPr id="11" name="Graphic 10" descr="Influencer with solid fill">
+                <a:extLst>
+                  <a:ext uri="{FF2B5EF4-FFF2-40B4-BE49-F238E27FC236}">
+                    <a16:creationId xmlns:a16="http://schemas.microsoft.com/office/drawing/2014/main" id="{467B303C-4B79-D573-07FA-AEF23C2D3D34}"/>
+                  </a:ext>
+                </a:extLst>
+              </p:cNvPr>
+              <p:cNvPicPr>
+                <a:picLocks noChangeAspect="1"/>
+              </p:cNvPicPr>
+              <p:nvPr/>
+            </p:nvPicPr>
+            <p:blipFill>
+              <a:blip r:embed="rId3">
+                <a:extLst>
+                  <a:ext uri="{96DAC541-7B7A-43D3-8B79-37D633B846F1}">
+                    <asvg:svgBlip xmlns:asvg="http://schemas.microsoft.com/office/drawing/2016/SVG/main" r:embed="rId4"/>
+                  </a:ext>
+                </a:extLst>
+              </a:blip>
+              <a:srcRect/>
+              <a:stretch/>
+            </p:blipFill>
+            <p:spPr>
+              <a:xfrm>
+                <a:off x="3396586" y="3769661"/>
+                <a:ext cx="914400" cy="914400"/>
+              </a:xfrm>
+              <a:prstGeom prst="rect">
+                <a:avLst/>
+              </a:prstGeom>
+            </p:spPr>
+          </p:pic>
+        </p:grpSp>
+        <p:sp>
+          <p:nvSpPr>
+            <p:cNvPr id="9" name="TextBox 8">
+              <a:extLst>
+                <a:ext uri="{FF2B5EF4-FFF2-40B4-BE49-F238E27FC236}">
+                  <a16:creationId xmlns:a16="http://schemas.microsoft.com/office/drawing/2014/main" id="{B1C019A6-0B2B-E0D6-F978-6D56F7FD7094}"/>
+                </a:ext>
+              </a:extLst>
+            </p:cNvPr>
+            <p:cNvSpPr txBox="1"/>
+            <p:nvPr/>
+          </p:nvSpPr>
+          <p:spPr>
+            <a:xfrm>
+              <a:off x="4894174" y="4669078"/>
+              <a:ext cx="2403652" cy="553998"/>
+            </a:xfrm>
+            <a:prstGeom prst="rect">
+              <a:avLst/>
+            </a:prstGeom>
+            <a:noFill/>
+          </p:spPr>
+          <p:txBody>
+            <a:bodyPr wrap="square" rtlCol="0">
+              <a:spAutoFit/>
+            </a:bodyPr>
+            <a:lstStyle/>
+            <a:p>
+              <a:pPr algn="ctr"/>
+              <a:r>
+                <a:rPr lang="en-US" b="1" dirty="0"/>
+                <a:t>1. Phenomenon</a:t>
+              </a:r>
+            </a:p>
+            <a:p>
+              <a:pPr algn="ctr"/>
+              <a:r>
+                <a:rPr lang="en-US" sz="1200" dirty="0"/>
+                <a:t>Creating an assumed causal DAG</a:t>
+              </a:r>
+            </a:p>
+          </p:txBody>
+        </p:sp>
+      </p:grpSp>
+      <p:grpSp>
+        <p:nvGrpSpPr>
+          <p:cNvPr id="12" name="Group 11">
+            <a:extLst>
+              <a:ext uri="{FF2B5EF4-FFF2-40B4-BE49-F238E27FC236}">
+                <a16:creationId xmlns:a16="http://schemas.microsoft.com/office/drawing/2014/main" id="{CB26F5BA-6967-2256-4E40-EC522262FA82}"/>
+              </a:ext>
+            </a:extLst>
+          </p:cNvPr>
+          <p:cNvGrpSpPr/>
+          <p:nvPr/>
+        </p:nvGrpSpPr>
+        <p:grpSpPr>
+          <a:xfrm>
+            <a:off x="3375858" y="1660056"/>
+            <a:ext cx="2403652" cy="1978742"/>
+            <a:chOff x="4894174" y="3429000"/>
+            <a:chExt cx="2403652" cy="1978742"/>
+          </a:xfrm>
+        </p:grpSpPr>
+        <p:grpSp>
+          <p:nvGrpSpPr>
+            <p:cNvPr id="13" name="Group 12">
+              <a:extLst>
+                <a:ext uri="{FF2B5EF4-FFF2-40B4-BE49-F238E27FC236}">
+                  <a16:creationId xmlns:a16="http://schemas.microsoft.com/office/drawing/2014/main" id="{E43E26FF-AFE0-EE31-189D-5D6CF0B95A25}"/>
+                </a:ext>
+              </a:extLst>
+            </p:cNvPr>
+            <p:cNvGrpSpPr/>
+            <p:nvPr/>
+          </p:nvGrpSpPr>
+          <p:grpSpPr>
+            <a:xfrm>
+              <a:off x="5556000" y="3429000"/>
+              <a:ext cx="1080000" cy="1080000"/>
+              <a:chOff x="3313786" y="3686861"/>
+              <a:chExt cx="1080000" cy="1080000"/>
+            </a:xfrm>
+          </p:grpSpPr>
+          <p:sp>
+            <p:nvSpPr>
+              <p:cNvPr id="15" name="Oval 14">
+                <a:extLst>
+                  <a:ext uri="{FF2B5EF4-FFF2-40B4-BE49-F238E27FC236}">
+                    <a16:creationId xmlns:a16="http://schemas.microsoft.com/office/drawing/2014/main" id="{352F06A2-8407-DBED-CC5B-A0025F0EC54E}"/>
+                  </a:ext>
+                </a:extLst>
+              </p:cNvPr>
+              <p:cNvSpPr/>
+              <p:nvPr/>
+            </p:nvSpPr>
+            <p:spPr>
+              <a:xfrm>
+                <a:off x="3313786" y="3686861"/>
+                <a:ext cx="1080000" cy="1080000"/>
+              </a:xfrm>
+              <a:prstGeom prst="ellipse">
+                <a:avLst/>
+              </a:prstGeom>
+              <a:solidFill>
+                <a:schemeClr val="accent1">
+                  <a:lumMod val="75000"/>
+                </a:schemeClr>
+              </a:solidFill>
+              <a:ln>
+                <a:noFill/>
+              </a:ln>
+              <a:effectLst>
+                <a:outerShdw blurRad="50800" dist="38100" dir="2700000" algn="tl" rotWithShape="0">
+                  <a:prstClr val="black">
+                    <a:alpha val="40000"/>
+                  </a:prstClr>
+                </a:outerShdw>
+              </a:effectLst>
+            </p:spPr>
+            <p:style>
+              <a:lnRef idx="2">
+                <a:schemeClr val="accent1">
+                  <a:shade val="15000"/>
+                </a:schemeClr>
+              </a:lnRef>
+              <a:fillRef idx="1">
+                <a:schemeClr val="accent1"/>
+              </a:fillRef>
+              <a:effectRef idx="0">
+                <a:schemeClr val="accent1"/>
+              </a:effectRef>
+              <a:fontRef idx="minor">
+                <a:schemeClr val="lt1"/>
+              </a:fontRef>
+            </p:style>
+            <p:txBody>
+              <a:bodyPr rtlCol="0" anchor="ctr"/>
+              <a:lstStyle/>
+              <a:p>
+                <a:pPr algn="ctr"/>
+                <a:endParaRPr lang="en-US"/>
+              </a:p>
+            </p:txBody>
+          </p:sp>
+          <p:pic>
+            <p:nvPicPr>
+              <p:cNvPr id="16" name="Graphic 15" descr="Single gear with solid fill">
+                <a:extLst>
+                  <a:ext uri="{FF2B5EF4-FFF2-40B4-BE49-F238E27FC236}">
+                    <a16:creationId xmlns:a16="http://schemas.microsoft.com/office/drawing/2014/main" id="{CBADB9B7-3DB9-38A5-CD8E-5F00DFCCF3EC}"/>
+                  </a:ext>
+                </a:extLst>
+              </p:cNvPr>
+              <p:cNvPicPr>
+                <a:picLocks noChangeAspect="1"/>
+              </p:cNvPicPr>
+              <p:nvPr/>
+            </p:nvPicPr>
+            <p:blipFill>
+              <a:blip r:embed="rId5">
+                <a:extLst>
+                  <a:ext uri="{96DAC541-7B7A-43D3-8B79-37D633B846F1}">
+                    <asvg:svgBlip xmlns:asvg="http://schemas.microsoft.com/office/drawing/2016/SVG/main" r:embed="rId6"/>
+                  </a:ext>
+                </a:extLst>
+              </a:blip>
+              <a:srcRect/>
+              <a:stretch/>
+            </p:blipFill>
+            <p:spPr>
+              <a:xfrm>
+                <a:off x="3396586" y="3769661"/>
+                <a:ext cx="914400" cy="914400"/>
+              </a:xfrm>
+              <a:prstGeom prst="rect">
+                <a:avLst/>
+              </a:prstGeom>
+            </p:spPr>
+          </p:pic>
+        </p:grpSp>
+        <p:sp>
+          <p:nvSpPr>
+            <p:cNvPr id="14" name="TextBox 13">
+              <a:extLst>
+                <a:ext uri="{FF2B5EF4-FFF2-40B4-BE49-F238E27FC236}">
+                  <a16:creationId xmlns:a16="http://schemas.microsoft.com/office/drawing/2014/main" id="{4934965F-ADF6-1CB2-8660-3DBC1C974024}"/>
+                </a:ext>
+              </a:extLst>
+            </p:cNvPr>
+            <p:cNvSpPr txBox="1"/>
+            <p:nvPr/>
+          </p:nvSpPr>
+          <p:spPr>
+            <a:xfrm>
+              <a:off x="4894174" y="4669078"/>
+              <a:ext cx="2403652" cy="738664"/>
+            </a:xfrm>
+            <a:prstGeom prst="rect">
+              <a:avLst/>
+            </a:prstGeom>
+            <a:noFill/>
+          </p:spPr>
+          <p:txBody>
+            <a:bodyPr wrap="square" rtlCol="0">
+              <a:spAutoFit/>
+            </a:bodyPr>
+            <a:lstStyle/>
+            <a:p>
+              <a:pPr algn="ctr"/>
+              <a:r>
+                <a:rPr lang="en-US" b="1" dirty="0"/>
+                <a:t>2. Regression</a:t>
+              </a:r>
+            </a:p>
+            <a:p>
+              <a:pPr algn="ctr"/>
+              <a:r>
+                <a:rPr lang="en-US" sz="1200" dirty="0"/>
+                <a:t>Deriving a statistical model and running a regression analysis</a:t>
+              </a:r>
+            </a:p>
+          </p:txBody>
+        </p:sp>
+      </p:grpSp>
+      <p:grpSp>
+        <p:nvGrpSpPr>
+          <p:cNvPr id="17" name="Group 16">
+            <a:extLst>
+              <a:ext uri="{FF2B5EF4-FFF2-40B4-BE49-F238E27FC236}">
+                <a16:creationId xmlns:a16="http://schemas.microsoft.com/office/drawing/2014/main" id="{70BCE0A1-8296-1C32-813A-108808F68FCC}"/>
+              </a:ext>
+            </a:extLst>
+          </p:cNvPr>
+          <p:cNvGrpSpPr/>
+          <p:nvPr/>
+        </p:nvGrpSpPr>
+        <p:grpSpPr>
+          <a:xfrm>
+            <a:off x="5913516" y="1660056"/>
+            <a:ext cx="2403652" cy="1978742"/>
+            <a:chOff x="4894174" y="3429000"/>
+            <a:chExt cx="2403652" cy="1978742"/>
+          </a:xfrm>
+        </p:grpSpPr>
+        <p:grpSp>
+          <p:nvGrpSpPr>
+            <p:cNvPr id="18" name="Group 17">
+              <a:extLst>
+                <a:ext uri="{FF2B5EF4-FFF2-40B4-BE49-F238E27FC236}">
+                  <a16:creationId xmlns:a16="http://schemas.microsoft.com/office/drawing/2014/main" id="{4B38539E-D26E-43D5-8B2E-F147C546F6B5}"/>
+                </a:ext>
+              </a:extLst>
+            </p:cNvPr>
+            <p:cNvGrpSpPr/>
+            <p:nvPr/>
+          </p:nvGrpSpPr>
+          <p:grpSpPr>
+            <a:xfrm>
+              <a:off x="5556000" y="3429000"/>
+              <a:ext cx="1080000" cy="1080000"/>
+              <a:chOff x="3313786" y="3686861"/>
+              <a:chExt cx="1080000" cy="1080000"/>
+            </a:xfrm>
+          </p:grpSpPr>
+          <p:sp>
+            <p:nvSpPr>
+              <p:cNvPr id="20" name="Oval 19">
+                <a:extLst>
+                  <a:ext uri="{FF2B5EF4-FFF2-40B4-BE49-F238E27FC236}">
+                    <a16:creationId xmlns:a16="http://schemas.microsoft.com/office/drawing/2014/main" id="{DDD5C1A8-09B2-4689-B36B-3235392BE5A7}"/>
+                  </a:ext>
+                </a:extLst>
+              </p:cNvPr>
+              <p:cNvSpPr/>
+              <p:nvPr/>
+            </p:nvSpPr>
+            <p:spPr>
+              <a:xfrm>
+                <a:off x="3313786" y="3686861"/>
+                <a:ext cx="1080000" cy="1080000"/>
+              </a:xfrm>
+              <a:prstGeom prst="ellipse">
+                <a:avLst/>
+              </a:prstGeom>
+              <a:solidFill>
+                <a:schemeClr val="accent1">
+                  <a:lumMod val="60000"/>
+                  <a:lumOff val="40000"/>
+                </a:schemeClr>
+              </a:solidFill>
+              <a:ln>
+                <a:noFill/>
+              </a:ln>
+              <a:effectLst>
+                <a:outerShdw blurRad="50800" dist="38100" dir="2700000" algn="tl" rotWithShape="0">
+                  <a:prstClr val="black">
+                    <a:alpha val="40000"/>
+                  </a:prstClr>
+                </a:outerShdw>
+              </a:effectLst>
+            </p:spPr>
+            <p:style>
+              <a:lnRef idx="2">
+                <a:schemeClr val="accent1">
+                  <a:shade val="15000"/>
+                </a:schemeClr>
+              </a:lnRef>
+              <a:fillRef idx="1">
+                <a:schemeClr val="accent1"/>
+              </a:fillRef>
+              <a:effectRef idx="0">
+                <a:schemeClr val="accent1"/>
+              </a:effectRef>
+              <a:fontRef idx="minor">
+                <a:schemeClr val="lt1"/>
+              </a:fontRef>
+            </p:style>
+            <p:txBody>
+              <a:bodyPr rtlCol="0" anchor="ctr"/>
+              <a:lstStyle/>
+              <a:p>
+                <a:pPr algn="ctr"/>
+                <a:endParaRPr lang="en-US"/>
+              </a:p>
+            </p:txBody>
+          </p:sp>
+          <p:pic>
+            <p:nvPicPr>
+              <p:cNvPr id="21" name="Graphic 20" descr="Normal Distribution with solid fill">
+                <a:extLst>
+                  <a:ext uri="{FF2B5EF4-FFF2-40B4-BE49-F238E27FC236}">
+                    <a16:creationId xmlns:a16="http://schemas.microsoft.com/office/drawing/2014/main" id="{1B18E834-75F1-FE16-944F-9EB618274205}"/>
+                  </a:ext>
+                </a:extLst>
+              </p:cNvPr>
+              <p:cNvPicPr>
+                <a:picLocks noChangeAspect="1"/>
+              </p:cNvPicPr>
+              <p:nvPr/>
+            </p:nvPicPr>
+            <p:blipFill>
+              <a:blip r:embed="rId7">
+                <a:extLst>
+                  <a:ext uri="{96DAC541-7B7A-43D3-8B79-37D633B846F1}">
+                    <asvg:svgBlip xmlns:asvg="http://schemas.microsoft.com/office/drawing/2016/SVG/main" r:embed="rId8"/>
+                  </a:ext>
+                </a:extLst>
+              </a:blip>
+              <a:srcRect/>
+              <a:stretch/>
+            </p:blipFill>
+            <p:spPr>
+              <a:xfrm>
+                <a:off x="3396586" y="3769661"/>
+                <a:ext cx="914400" cy="914400"/>
+              </a:xfrm>
+              <a:prstGeom prst="rect">
+                <a:avLst/>
+              </a:prstGeom>
+            </p:spPr>
+          </p:pic>
+        </p:grpSp>
+        <p:sp>
+          <p:nvSpPr>
+            <p:cNvPr id="19" name="TextBox 18">
+              <a:extLst>
+                <a:ext uri="{FF2B5EF4-FFF2-40B4-BE49-F238E27FC236}">
+                  <a16:creationId xmlns:a16="http://schemas.microsoft.com/office/drawing/2014/main" id="{AC942F53-C749-0A4D-33A4-9901E6980153}"/>
+                </a:ext>
+              </a:extLst>
+            </p:cNvPr>
+            <p:cNvSpPr txBox="1"/>
+            <p:nvPr/>
+          </p:nvSpPr>
+          <p:spPr>
+            <a:xfrm>
+              <a:off x="4894174" y="4669078"/>
+              <a:ext cx="2403652" cy="738664"/>
+            </a:xfrm>
+            <a:prstGeom prst="rect">
+              <a:avLst/>
+            </a:prstGeom>
+            <a:noFill/>
+          </p:spPr>
+          <p:txBody>
+            <a:bodyPr wrap="square" rtlCol="0">
+              <a:spAutoFit/>
+            </a:bodyPr>
+            <a:lstStyle/>
+            <a:p>
+              <a:pPr algn="ctr"/>
+              <a:r>
+                <a:rPr lang="en-US" b="1" dirty="0"/>
+                <a:t>3. Comparison</a:t>
+              </a:r>
+            </a:p>
+            <a:p>
+              <a:pPr algn="ctr"/>
+              <a:r>
+                <a:rPr lang="en-US" sz="1200" dirty="0"/>
+                <a:t>Comparing the results of the analysis with the ground truth</a:t>
+              </a:r>
+            </a:p>
+          </p:txBody>
+        </p:sp>
+      </p:grpSp>
+      <p:grpSp>
+        <p:nvGrpSpPr>
+          <p:cNvPr id="22" name="Group 21">
+            <a:extLst>
+              <a:ext uri="{FF2B5EF4-FFF2-40B4-BE49-F238E27FC236}">
+                <a16:creationId xmlns:a16="http://schemas.microsoft.com/office/drawing/2014/main" id="{1A770D6C-3AF5-AE96-61AA-1E9C1D99ACE7}"/>
+              </a:ext>
+            </a:extLst>
+          </p:cNvPr>
+          <p:cNvGrpSpPr/>
+          <p:nvPr/>
+        </p:nvGrpSpPr>
+        <p:grpSpPr>
+          <a:xfrm>
+            <a:off x="8451174" y="1660056"/>
+            <a:ext cx="2403652" cy="1794076"/>
+            <a:chOff x="4894174" y="3429000"/>
+            <a:chExt cx="2403652" cy="1794076"/>
+          </a:xfrm>
+        </p:grpSpPr>
+        <p:grpSp>
+          <p:nvGrpSpPr>
+            <p:cNvPr id="23" name="Group 22">
+              <a:extLst>
+                <a:ext uri="{FF2B5EF4-FFF2-40B4-BE49-F238E27FC236}">
+                  <a16:creationId xmlns:a16="http://schemas.microsoft.com/office/drawing/2014/main" id="{BC1FE594-5E63-A252-D159-88A91E7E235D}"/>
+                </a:ext>
+              </a:extLst>
+            </p:cNvPr>
+            <p:cNvGrpSpPr/>
+            <p:nvPr/>
+          </p:nvGrpSpPr>
+          <p:grpSpPr>
+            <a:xfrm>
+              <a:off x="5556000" y="3429000"/>
+              <a:ext cx="1080000" cy="1080000"/>
+              <a:chOff x="3313786" y="3686861"/>
+              <a:chExt cx="1080000" cy="1080000"/>
+            </a:xfrm>
+          </p:grpSpPr>
+          <p:sp>
+            <p:nvSpPr>
+              <p:cNvPr id="25" name="Oval 24">
+                <a:extLst>
+                  <a:ext uri="{FF2B5EF4-FFF2-40B4-BE49-F238E27FC236}">
+                    <a16:creationId xmlns:a16="http://schemas.microsoft.com/office/drawing/2014/main" id="{BC9A9EF2-039B-12D3-38EA-5FA34399F4CF}"/>
+                  </a:ext>
+                </a:extLst>
+              </p:cNvPr>
+              <p:cNvSpPr/>
+              <p:nvPr/>
+            </p:nvSpPr>
+            <p:spPr>
+              <a:xfrm>
+                <a:off x="3313786" y="3686861"/>
+                <a:ext cx="1080000" cy="1080000"/>
+              </a:xfrm>
+              <a:prstGeom prst="ellipse">
+                <a:avLst/>
+              </a:prstGeom>
+              <a:solidFill>
+                <a:schemeClr val="accent1">
+                  <a:lumMod val="40000"/>
+                  <a:lumOff val="60000"/>
+                </a:schemeClr>
+              </a:solidFill>
+              <a:ln>
+                <a:noFill/>
+              </a:ln>
+              <a:effectLst>
+                <a:outerShdw blurRad="50800" dist="38100" dir="2700000" algn="tl" rotWithShape="0">
+                  <a:prstClr val="black">
+                    <a:alpha val="40000"/>
+                  </a:prstClr>
+                </a:outerShdw>
+              </a:effectLst>
+            </p:spPr>
+            <p:style>
+              <a:lnRef idx="2">
+                <a:schemeClr val="accent1">
+                  <a:shade val="15000"/>
+                </a:schemeClr>
+              </a:lnRef>
+              <a:fillRef idx="1">
+                <a:schemeClr val="accent1"/>
+              </a:fillRef>
+              <a:effectRef idx="0">
+                <a:schemeClr val="accent1"/>
+              </a:effectRef>
+              <a:fontRef idx="minor">
+                <a:schemeClr val="lt1"/>
+              </a:fontRef>
+            </p:style>
+            <p:txBody>
+              <a:bodyPr rtlCol="0" anchor="ctr"/>
+              <a:lstStyle/>
+              <a:p>
+                <a:pPr algn="ctr"/>
+                <a:endParaRPr lang="en-US"/>
+              </a:p>
+            </p:txBody>
+          </p:sp>
+          <p:pic>
+            <p:nvPicPr>
+              <p:cNvPr id="26" name="Graphic 25" descr="Influencer with solid fill">
+                <a:extLst>
+                  <a:ext uri="{FF2B5EF4-FFF2-40B4-BE49-F238E27FC236}">
+                    <a16:creationId xmlns:a16="http://schemas.microsoft.com/office/drawing/2014/main" id="{4D9EF501-1379-4E65-CBA5-2250127D3B88}"/>
+                  </a:ext>
+                </a:extLst>
+              </p:cNvPr>
+              <p:cNvPicPr>
+                <a:picLocks noChangeAspect="1"/>
+              </p:cNvPicPr>
+              <p:nvPr/>
+            </p:nvPicPr>
+            <p:blipFill>
+              <a:blip r:embed="rId3">
+                <a:extLst>
+                  <a:ext uri="{96DAC541-7B7A-43D3-8B79-37D633B846F1}">
+                    <asvg:svgBlip xmlns:asvg="http://schemas.microsoft.com/office/drawing/2016/SVG/main" r:embed="rId4"/>
+                  </a:ext>
+                </a:extLst>
+              </a:blip>
+              <a:srcRect/>
+              <a:stretch/>
+            </p:blipFill>
+            <p:spPr>
+              <a:xfrm>
+                <a:off x="3396586" y="3769661"/>
+                <a:ext cx="914400" cy="914400"/>
+              </a:xfrm>
+              <a:prstGeom prst="rect">
+                <a:avLst/>
+              </a:prstGeom>
+            </p:spPr>
+          </p:pic>
+        </p:grpSp>
+        <p:sp>
+          <p:nvSpPr>
+            <p:cNvPr id="24" name="TextBox 23">
+              <a:extLst>
+                <a:ext uri="{FF2B5EF4-FFF2-40B4-BE49-F238E27FC236}">
+                  <a16:creationId xmlns:a16="http://schemas.microsoft.com/office/drawing/2014/main" id="{F7B53C60-EB36-425F-20AB-DD049D71F409}"/>
+                </a:ext>
+              </a:extLst>
+            </p:cNvPr>
+            <p:cNvSpPr txBox="1"/>
+            <p:nvPr/>
+          </p:nvSpPr>
+          <p:spPr>
+            <a:xfrm>
+              <a:off x="4894174" y="4669078"/>
+              <a:ext cx="2403652" cy="553998"/>
+            </a:xfrm>
+            <a:prstGeom prst="rect">
+              <a:avLst/>
+            </a:prstGeom>
+            <a:noFill/>
+          </p:spPr>
+          <p:txBody>
+            <a:bodyPr wrap="square" rtlCol="0">
+              <a:spAutoFit/>
+            </a:bodyPr>
+            <a:lstStyle/>
+            <a:p>
+              <a:pPr algn="ctr"/>
+              <a:r>
+                <a:rPr lang="en-US" b="1" dirty="0"/>
+                <a:t>4. Reveal</a:t>
+              </a:r>
+            </a:p>
+            <a:p>
+              <a:pPr algn="ctr"/>
+              <a:r>
+                <a:rPr lang="en-US" sz="1200" dirty="0"/>
+                <a:t>Revealing the actual causal DAG</a:t>
+              </a:r>
+            </a:p>
+          </p:txBody>
+        </p:sp>
+      </p:grpSp>
+      <p:cxnSp>
+        <p:nvCxnSpPr>
+          <p:cNvPr id="28" name="Straight Arrow Connector 27">
+            <a:extLst>
+              <a:ext uri="{FF2B5EF4-FFF2-40B4-BE49-F238E27FC236}">
+                <a16:creationId xmlns:a16="http://schemas.microsoft.com/office/drawing/2014/main" id="{03982014-ACAC-C267-48B0-43B2B6A14649}"/>
+              </a:ext>
+            </a:extLst>
+          </p:cNvPr>
+          <p:cNvCxnSpPr>
+            <a:stCxn id="10" idx="6"/>
+            <a:endCxn id="15" idx="2"/>
+          </p:cNvCxnSpPr>
+          <p:nvPr/>
+        </p:nvCxnSpPr>
+        <p:spPr>
+          <a:xfrm>
+            <a:off x="2580026" y="2200056"/>
+            <a:ext cx="1457658" cy="0"/>
+          </a:xfrm>
+          <a:prstGeom prst="straightConnector1">
+            <a:avLst/>
+          </a:prstGeom>
+          <a:ln>
+            <a:tailEnd type="triangle"/>
+          </a:ln>
+        </p:spPr>
+        <p:style>
+          <a:lnRef idx="2">
+            <a:schemeClr val="dk1"/>
+          </a:lnRef>
+          <a:fillRef idx="0">
+            <a:schemeClr val="dk1"/>
+          </a:fillRef>
+          <a:effectRef idx="1">
+            <a:schemeClr val="dk1"/>
+          </a:effectRef>
+          <a:fontRef idx="minor">
+            <a:schemeClr val="tx1"/>
+          </a:fontRef>
+        </p:style>
+      </p:cxnSp>
+      <p:cxnSp>
+        <p:nvCxnSpPr>
+          <p:cNvPr id="29" name="Straight Arrow Connector 28">
+            <a:extLst>
+              <a:ext uri="{FF2B5EF4-FFF2-40B4-BE49-F238E27FC236}">
+                <a16:creationId xmlns:a16="http://schemas.microsoft.com/office/drawing/2014/main" id="{102B4E55-9C28-5C4D-C554-AF117EA85F0E}"/>
+              </a:ext>
+            </a:extLst>
+          </p:cNvPr>
+          <p:cNvCxnSpPr>
+            <a:cxnSpLocks/>
+            <a:stCxn id="15" idx="6"/>
+            <a:endCxn id="20" idx="2"/>
+          </p:cNvCxnSpPr>
+          <p:nvPr/>
+        </p:nvCxnSpPr>
+        <p:spPr>
+          <a:xfrm>
+            <a:off x="5117684" y="2200056"/>
+            <a:ext cx="1457658" cy="0"/>
+          </a:xfrm>
+          <a:prstGeom prst="straightConnector1">
+            <a:avLst/>
+          </a:prstGeom>
+          <a:ln>
+            <a:tailEnd type="triangle"/>
+          </a:ln>
+        </p:spPr>
+        <p:style>
+          <a:lnRef idx="2">
+            <a:schemeClr val="dk1"/>
+          </a:lnRef>
+          <a:fillRef idx="0">
+            <a:schemeClr val="dk1"/>
+          </a:fillRef>
+          <a:effectRef idx="1">
+            <a:schemeClr val="dk1"/>
+          </a:effectRef>
+          <a:fontRef idx="minor">
+            <a:schemeClr val="tx1"/>
+          </a:fontRef>
+        </p:style>
+      </p:cxnSp>
+      <p:cxnSp>
+        <p:nvCxnSpPr>
+          <p:cNvPr id="32" name="Straight Arrow Connector 31">
+            <a:extLst>
+              <a:ext uri="{FF2B5EF4-FFF2-40B4-BE49-F238E27FC236}">
+                <a16:creationId xmlns:a16="http://schemas.microsoft.com/office/drawing/2014/main" id="{3ECB8D05-863A-7830-6990-9E8496766E4F}"/>
+              </a:ext>
+            </a:extLst>
+          </p:cNvPr>
+          <p:cNvCxnSpPr>
+            <a:cxnSpLocks/>
+            <a:stCxn id="20" idx="6"/>
+            <a:endCxn id="25" idx="2"/>
+          </p:cNvCxnSpPr>
+          <p:nvPr/>
+        </p:nvCxnSpPr>
+        <p:spPr>
+          <a:xfrm>
+            <a:off x="7655342" y="2200056"/>
+            <a:ext cx="1457658" cy="0"/>
+          </a:xfrm>
+          <a:prstGeom prst="straightConnector1">
+            <a:avLst/>
+          </a:prstGeom>
+          <a:ln>
+            <a:tailEnd type="triangle"/>
+          </a:ln>
+        </p:spPr>
+        <p:style>
+          <a:lnRef idx="2">
+            <a:schemeClr val="dk1"/>
+          </a:lnRef>
+          <a:fillRef idx="0">
+            <a:schemeClr val="dk1"/>
+          </a:fillRef>
+          <a:effectRef idx="1">
+            <a:schemeClr val="dk1"/>
+          </a:effectRef>
+          <a:fontRef idx="minor">
+            <a:schemeClr val="tx1"/>
+          </a:fontRef>
+        </p:style>
+      </p:cxnSp>
+      <p:sp>
+        <p:nvSpPr>
+          <p:cNvPr id="35" name="Oval 34">
+            <a:extLst>
+              <a:ext uri="{FF2B5EF4-FFF2-40B4-BE49-F238E27FC236}">
+                <a16:creationId xmlns:a16="http://schemas.microsoft.com/office/drawing/2014/main" id="{89B08108-FC4A-40B4-6C99-C16C11BEA937}"/>
+              </a:ext>
+            </a:extLst>
+          </p:cNvPr>
+          <p:cNvSpPr/>
+          <p:nvPr/>
+        </p:nvSpPr>
+        <p:spPr>
+          <a:xfrm>
+            <a:off x="1312406" y="4446160"/>
+            <a:ext cx="360000" cy="360000"/>
+          </a:xfrm>
+          <a:prstGeom prst="ellipse">
+            <a:avLst/>
+          </a:prstGeom>
+          <a:solidFill>
+            <a:srgbClr val="F8766D"/>
+          </a:solidFill>
+          <a:ln>
+            <a:solidFill>
+              <a:srgbClr val="D0180A"/>
+            </a:solidFill>
+          </a:ln>
+        </p:spPr>
+        <p:style>
+          <a:lnRef idx="2">
+            <a:schemeClr val="accent1">
+              <a:shade val="15000"/>
+            </a:schemeClr>
+          </a:lnRef>
+          <a:fillRef idx="1">
+            <a:schemeClr val="accent1"/>
+          </a:fillRef>
+          <a:effectRef idx="0">
+            <a:schemeClr val="accent1"/>
+          </a:effectRef>
+          <a:fontRef idx="minor">
+            <a:schemeClr val="lt1"/>
+          </a:fontRef>
+        </p:style>
+        <p:txBody>
+          <a:bodyPr rtlCol="0" anchor="ctr"/>
+          <a:lstStyle/>
+          <a:p>
+            <a:pPr algn="ctr"/>
+            <a:endParaRPr lang="en-US"/>
+          </a:p>
+        </p:txBody>
+      </p:sp>
+      <p:sp>
+        <p:nvSpPr>
+          <p:cNvPr id="36" name="Oval 35">
+            <a:extLst>
+              <a:ext uri="{FF2B5EF4-FFF2-40B4-BE49-F238E27FC236}">
+                <a16:creationId xmlns:a16="http://schemas.microsoft.com/office/drawing/2014/main" id="{9F170907-2FD5-C0B1-C07D-FFBDB2F9F350}"/>
+              </a:ext>
+            </a:extLst>
+          </p:cNvPr>
+          <p:cNvSpPr/>
+          <p:nvPr/>
+        </p:nvSpPr>
+        <p:spPr>
+          <a:xfrm>
+            <a:off x="2392406" y="4446160"/>
+            <a:ext cx="360000" cy="360000"/>
+          </a:xfrm>
+          <a:prstGeom prst="ellipse">
+            <a:avLst/>
+          </a:prstGeom>
+          <a:solidFill>
+            <a:srgbClr val="00BFC4"/>
+          </a:solidFill>
+          <a:ln>
+            <a:solidFill>
+              <a:srgbClr val="006D70"/>
+            </a:solidFill>
+          </a:ln>
+        </p:spPr>
+        <p:style>
+          <a:lnRef idx="2">
+            <a:schemeClr val="accent1">
+              <a:shade val="15000"/>
+            </a:schemeClr>
+          </a:lnRef>
+          <a:fillRef idx="1">
+            <a:schemeClr val="accent1"/>
+          </a:fillRef>
+          <a:effectRef idx="0">
+            <a:schemeClr val="accent1"/>
+          </a:effectRef>
+          <a:fontRef idx="minor">
+            <a:schemeClr val="lt1"/>
+          </a:fontRef>
+        </p:style>
+        <p:txBody>
+          <a:bodyPr rtlCol="0" anchor="ctr"/>
+          <a:lstStyle/>
+          <a:p>
+            <a:pPr algn="ctr"/>
+            <a:endParaRPr lang="en-US"/>
+          </a:p>
+        </p:txBody>
+      </p:sp>
+      <p:cxnSp>
+        <p:nvCxnSpPr>
+          <p:cNvPr id="37" name="Straight Arrow Connector 36">
+            <a:extLst>
+              <a:ext uri="{FF2B5EF4-FFF2-40B4-BE49-F238E27FC236}">
+                <a16:creationId xmlns:a16="http://schemas.microsoft.com/office/drawing/2014/main" id="{48EDD740-8813-622F-9D67-595FD9CEF02B}"/>
+              </a:ext>
+            </a:extLst>
+          </p:cNvPr>
+          <p:cNvCxnSpPr>
+            <a:stCxn id="35" idx="6"/>
+            <a:endCxn id="36" idx="2"/>
+          </p:cNvCxnSpPr>
+          <p:nvPr/>
+        </p:nvCxnSpPr>
+        <p:spPr>
+          <a:xfrm>
+            <a:off x="1672406" y="4626160"/>
+            <a:ext cx="720000" cy="0"/>
+          </a:xfrm>
+          <a:prstGeom prst="straightConnector1">
+            <a:avLst/>
+          </a:prstGeom>
+          <a:ln>
+            <a:tailEnd type="triangle"/>
+          </a:ln>
+        </p:spPr>
+        <p:style>
+          <a:lnRef idx="2">
+            <a:schemeClr val="dk1"/>
+          </a:lnRef>
+          <a:fillRef idx="0">
+            <a:schemeClr val="dk1"/>
+          </a:fillRef>
+          <a:effectRef idx="1">
+            <a:schemeClr val="dk1"/>
+          </a:effectRef>
+          <a:fontRef idx="minor">
+            <a:schemeClr val="tx1"/>
+          </a:fontRef>
+        </p:style>
+      </p:cxnSp>
+      <p:sp>
+        <p:nvSpPr>
+          <p:cNvPr id="38" name="TextBox 37">
+            <a:extLst>
+              <a:ext uri="{FF2B5EF4-FFF2-40B4-BE49-F238E27FC236}">
+                <a16:creationId xmlns:a16="http://schemas.microsoft.com/office/drawing/2014/main" id="{5F03EEF7-5073-9CA6-FE5B-A41BD36BE779}"/>
+              </a:ext>
+            </a:extLst>
+          </p:cNvPr>
+          <p:cNvSpPr txBox="1"/>
+          <p:nvPr/>
+        </p:nvSpPr>
+        <p:spPr>
+          <a:xfrm>
+            <a:off x="1076580" y="3866702"/>
+            <a:ext cx="1623232" cy="523220"/>
+          </a:xfrm>
+          <a:prstGeom prst="rect">
+            <a:avLst/>
+          </a:prstGeom>
+          <a:noFill/>
+        </p:spPr>
+        <p:txBody>
+          <a:bodyPr wrap="square" rtlCol="0">
+            <a:spAutoFit/>
+          </a:bodyPr>
+          <a:lstStyle/>
+          <a:p>
+            <a:r>
+              <a:rPr lang="en-US" sz="1400" dirty="0">
+                <a:solidFill>
+                  <a:srgbClr val="D0180A"/>
+                </a:solidFill>
+              </a:rPr>
+              <a:t>document reading technique</a:t>
+            </a:r>
+          </a:p>
+        </p:txBody>
+      </p:sp>
+      <p:sp>
+        <p:nvSpPr>
+          <p:cNvPr id="39" name="TextBox 38">
+            <a:extLst>
+              <a:ext uri="{FF2B5EF4-FFF2-40B4-BE49-F238E27FC236}">
+                <a16:creationId xmlns:a16="http://schemas.microsoft.com/office/drawing/2014/main" id="{E81F6427-E809-AF69-E433-8FE2FF465ADA}"/>
+              </a:ext>
+            </a:extLst>
+          </p:cNvPr>
+          <p:cNvSpPr txBox="1"/>
+          <p:nvPr/>
+        </p:nvSpPr>
+        <p:spPr>
+          <a:xfrm>
+            <a:off x="1434886" y="4890507"/>
+            <a:ext cx="1534587" cy="307777"/>
+          </a:xfrm>
+          <a:prstGeom prst="rect">
+            <a:avLst/>
+          </a:prstGeom>
+          <a:noFill/>
+        </p:spPr>
+        <p:txBody>
+          <a:bodyPr wrap="none" rtlCol="0">
+            <a:spAutoFit/>
+          </a:bodyPr>
+          <a:lstStyle/>
+          <a:p>
+            <a:r>
+              <a:rPr lang="en-US" sz="1400" dirty="0">
+                <a:solidFill>
+                  <a:srgbClr val="006D70"/>
+                </a:solidFill>
+              </a:rPr>
+              <a:t>identified defects</a:t>
+            </a:r>
+          </a:p>
+        </p:txBody>
+      </p:sp>
+      <p:pic>
+        <p:nvPicPr>
+          <p:cNvPr id="43" name="Picture 42">
+            <a:extLst>
+              <a:ext uri="{FF2B5EF4-FFF2-40B4-BE49-F238E27FC236}">
+                <a16:creationId xmlns:a16="http://schemas.microsoft.com/office/drawing/2014/main" id="{0A19FB5A-FE11-8DE1-A226-CD14B2E2FF5A}"/>
+              </a:ext>
+            </a:extLst>
+          </p:cNvPr>
+          <p:cNvPicPr>
+            <a:picLocks noChangeAspect="1"/>
+          </p:cNvPicPr>
+          <p:nvPr/>
+        </p:nvPicPr>
+        <p:blipFill>
+          <a:blip r:embed="rId9">
+            <a:extLst>
+              <a:ext uri="{28A0092B-C50C-407E-A947-70E740481C1C}">
+                <a14:useLocalDpi xmlns:a14="http://schemas.microsoft.com/office/drawing/2010/main" val="0"/>
+              </a:ext>
+            </a:extLst>
+          </a:blip>
+          <a:stretch>
+            <a:fillRect/>
+          </a:stretch>
+        </p:blipFill>
+        <p:spPr>
+          <a:xfrm>
+            <a:off x="6216180" y="4338875"/>
+            <a:ext cx="1798324" cy="719329"/>
+          </a:xfrm>
+          <a:prstGeom prst="rect">
+            <a:avLst/>
+          </a:prstGeom>
+        </p:spPr>
+      </p:pic>
+      <p:cxnSp>
+        <p:nvCxnSpPr>
+          <p:cNvPr id="44" name="Straight Arrow Connector 43">
+            <a:extLst>
+              <a:ext uri="{FF2B5EF4-FFF2-40B4-BE49-F238E27FC236}">
+                <a16:creationId xmlns:a16="http://schemas.microsoft.com/office/drawing/2014/main" id="{8439A8CF-FD54-84E1-B422-1FFCA9CC7EEE}"/>
+              </a:ext>
+            </a:extLst>
+          </p:cNvPr>
+          <p:cNvCxnSpPr>
+            <a:cxnSpLocks/>
+            <a:stCxn id="48" idx="3"/>
+            <a:endCxn id="49" idx="1"/>
+          </p:cNvCxnSpPr>
+          <p:nvPr/>
+        </p:nvCxnSpPr>
+        <p:spPr>
+          <a:xfrm>
+            <a:off x="9473000" y="4626160"/>
+            <a:ext cx="720000" cy="0"/>
+          </a:xfrm>
+          <a:prstGeom prst="straightConnector1">
+            <a:avLst/>
+          </a:prstGeom>
+          <a:ln>
+            <a:tailEnd type="triangle"/>
+          </a:ln>
+        </p:spPr>
+        <p:style>
+          <a:lnRef idx="2">
+            <a:schemeClr val="dk1"/>
+          </a:lnRef>
+          <a:fillRef idx="0">
+            <a:schemeClr val="dk1"/>
+          </a:fillRef>
+          <a:effectRef idx="1">
+            <a:schemeClr val="dk1"/>
+          </a:effectRef>
+          <a:fontRef idx="minor">
+            <a:schemeClr val="tx1"/>
+          </a:fontRef>
+        </p:style>
+      </p:cxnSp>
+      <p:sp>
+        <p:nvSpPr>
+          <p:cNvPr id="45" name="TextBox 44">
+            <a:extLst>
+              <a:ext uri="{FF2B5EF4-FFF2-40B4-BE49-F238E27FC236}">
+                <a16:creationId xmlns:a16="http://schemas.microsoft.com/office/drawing/2014/main" id="{F6C58606-EDB5-B70F-AA99-66D4158915F7}"/>
+              </a:ext>
+            </a:extLst>
+          </p:cNvPr>
+          <p:cNvSpPr txBox="1"/>
+          <p:nvPr/>
+        </p:nvSpPr>
+        <p:spPr>
+          <a:xfrm>
+            <a:off x="8877174" y="3930060"/>
+            <a:ext cx="1685434" cy="523220"/>
+          </a:xfrm>
+          <a:prstGeom prst="rect">
+            <a:avLst/>
+          </a:prstGeom>
+          <a:noFill/>
+        </p:spPr>
+        <p:txBody>
+          <a:bodyPr wrap="square" rtlCol="0">
+            <a:spAutoFit/>
+          </a:bodyPr>
+          <a:lstStyle/>
+          <a:p>
+            <a:r>
+              <a:rPr lang="en-US" sz="1400" dirty="0">
+                <a:solidFill>
+                  <a:srgbClr val="D0180A"/>
+                </a:solidFill>
+              </a:rPr>
+              <a:t>document reading technique</a:t>
+            </a:r>
+          </a:p>
+        </p:txBody>
+      </p:sp>
+      <p:sp>
+        <p:nvSpPr>
+          <p:cNvPr id="46" name="TextBox 45">
+            <a:extLst>
+              <a:ext uri="{FF2B5EF4-FFF2-40B4-BE49-F238E27FC236}">
+                <a16:creationId xmlns:a16="http://schemas.microsoft.com/office/drawing/2014/main" id="{4D9966DD-39CE-BB29-75A0-32544B5A9D69}"/>
+              </a:ext>
+            </a:extLst>
+          </p:cNvPr>
+          <p:cNvSpPr txBox="1"/>
+          <p:nvPr/>
+        </p:nvSpPr>
+        <p:spPr>
+          <a:xfrm>
+            <a:off x="9120766" y="4893345"/>
+            <a:ext cx="1534587" cy="307777"/>
+          </a:xfrm>
+          <a:prstGeom prst="rect">
+            <a:avLst/>
+          </a:prstGeom>
+          <a:noFill/>
+        </p:spPr>
+        <p:txBody>
+          <a:bodyPr wrap="none" rtlCol="0">
+            <a:spAutoFit/>
+          </a:bodyPr>
+          <a:lstStyle/>
+          <a:p>
+            <a:r>
+              <a:rPr lang="en-US" sz="1400" dirty="0">
+                <a:solidFill>
+                  <a:srgbClr val="006D70"/>
+                </a:solidFill>
+              </a:rPr>
+              <a:t>identified defects</a:t>
+            </a:r>
+          </a:p>
+        </p:txBody>
+      </p:sp>
+      <mc:AlternateContent xmlns:mc="http://schemas.openxmlformats.org/markup-compatibility/2006">
+        <mc:Choice xmlns:a14="http://schemas.microsoft.com/office/drawing/2010/main" Requires="a14">
+          <p:sp>
+            <p:nvSpPr>
+              <p:cNvPr id="47" name="TextBox 46">
+                <a:extLst>
+                  <a:ext uri="{FF2B5EF4-FFF2-40B4-BE49-F238E27FC236}">
+                    <a16:creationId xmlns:a16="http://schemas.microsoft.com/office/drawing/2014/main" id="{0CE4AFDA-2A73-13F9-1D57-E58240823910}"/>
+                  </a:ext>
+                </a:extLst>
+              </p:cNvPr>
+              <p:cNvSpPr txBox="1"/>
+              <p:nvPr/>
+            </p:nvSpPr>
+            <p:spPr>
+              <a:xfrm>
+                <a:off x="9533917" y="4630365"/>
+                <a:ext cx="547689" cy="307777"/>
+              </a:xfrm>
+              <a:prstGeom prst="rect">
+                <a:avLst/>
+              </a:prstGeom>
+              <a:noFill/>
+            </p:spPr>
+            <p:txBody>
+              <a:bodyPr wrap="square">
+                <a:spAutoFit/>
+              </a:bodyPr>
+              <a:lstStyle/>
+              <a:p>
+                <a:pPr/>
+                <a14:m>
+                  <m:oMathPara xmlns:m="http://schemas.openxmlformats.org/officeDocument/2006/math">
+                    <m:oMathParaPr>
+                      <m:jc m:val="centerGroup"/>
+                    </m:oMathParaPr>
+                    <m:oMath xmlns:m="http://schemas.openxmlformats.org/officeDocument/2006/math">
+                      <m:r>
+                        <a:rPr lang="sv-SE" sz="1400" b="0" i="1" smtClean="0">
+                          <a:latin typeface="Cambria Math" panose="02040503050406030204" pitchFamily="18" charset="0"/>
+                        </a:rPr>
+                        <m:t>5</m:t>
+                      </m:r>
+                    </m:oMath>
+                  </m:oMathPara>
+                </a14:m>
+                <a:endParaRPr lang="en-US" sz="1400" dirty="0"/>
+              </a:p>
+            </p:txBody>
+          </p:sp>
+        </mc:Choice>
+        <mc:Fallback>
+          <p:sp>
+            <p:nvSpPr>
+              <p:cNvPr id="47" name="TextBox 46">
+                <a:extLst>
+                  <a:ext uri="{FF2B5EF4-FFF2-40B4-BE49-F238E27FC236}">
+                    <a16:creationId xmlns:a16="http://schemas.microsoft.com/office/drawing/2014/main" id="{0CE4AFDA-2A73-13F9-1D57-E58240823910}"/>
+                  </a:ext>
+                </a:extLst>
+              </p:cNvPr>
+              <p:cNvSpPr txBox="1">
+                <a:spLocks noRot="1" noChangeAspect="1" noMove="1" noResize="1" noEditPoints="1" noAdjustHandles="1" noChangeArrowheads="1" noChangeShapeType="1" noTextEdit="1"/>
+              </p:cNvSpPr>
+              <p:nvPr/>
+            </p:nvSpPr>
+            <p:spPr>
+              <a:xfrm>
+                <a:off x="9533917" y="4630365"/>
+                <a:ext cx="547689" cy="307777"/>
+              </a:xfrm>
+              <a:prstGeom prst="rect">
+                <a:avLst/>
+              </a:prstGeom>
+              <a:blipFill>
+                <a:blip r:embed="rId10"/>
+                <a:stretch>
+                  <a:fillRect/>
+                </a:stretch>
+              </a:blipFill>
+            </p:spPr>
+            <p:txBody>
+              <a:bodyPr/>
+              <a:lstStyle/>
+              <a:p>
+                <a:r>
+                  <a:rPr lang="en-SE">
+                    <a:noFill/>
+                  </a:rPr>
+                  <a:t> </a:t>
+                </a:r>
+              </a:p>
+            </p:txBody>
+          </p:sp>
+        </mc:Fallback>
+      </mc:AlternateContent>
+      <p:sp>
+        <p:nvSpPr>
+          <p:cNvPr id="48" name="Rectangle: Rounded Corners 47">
+            <a:extLst>
+              <a:ext uri="{FF2B5EF4-FFF2-40B4-BE49-F238E27FC236}">
+                <a16:creationId xmlns:a16="http://schemas.microsoft.com/office/drawing/2014/main" id="{CE3A1435-32C5-6A7B-2293-7A21A65E79D8}"/>
+              </a:ext>
+            </a:extLst>
+          </p:cNvPr>
+          <p:cNvSpPr/>
+          <p:nvPr/>
+        </p:nvSpPr>
+        <p:spPr>
+          <a:xfrm>
+            <a:off x="9113000" y="4446160"/>
+            <a:ext cx="360000" cy="360000"/>
+          </a:xfrm>
+          <a:prstGeom prst="roundRect">
+            <a:avLst/>
+          </a:prstGeom>
+          <a:solidFill>
+            <a:srgbClr val="F8766D"/>
+          </a:solidFill>
+          <a:ln>
+            <a:solidFill>
+              <a:srgbClr val="D0180A"/>
+            </a:solidFill>
+          </a:ln>
+        </p:spPr>
+        <p:style>
+          <a:lnRef idx="2">
+            <a:schemeClr val="accent1">
+              <a:shade val="15000"/>
+            </a:schemeClr>
+          </a:lnRef>
+          <a:fillRef idx="1">
+            <a:schemeClr val="accent1"/>
+          </a:fillRef>
+          <a:effectRef idx="0">
+            <a:schemeClr val="accent1"/>
+          </a:effectRef>
+          <a:fontRef idx="minor">
+            <a:schemeClr val="lt1"/>
+          </a:fontRef>
+        </p:style>
+        <p:txBody>
+          <a:bodyPr rtlCol="0" anchor="ctr"/>
+          <a:lstStyle/>
+          <a:p>
+            <a:pPr algn="ctr"/>
+            <a:endParaRPr lang="en-US" dirty="0"/>
+          </a:p>
+        </p:txBody>
+      </p:sp>
+      <p:sp>
+        <p:nvSpPr>
+          <p:cNvPr id="49" name="Rectangle: Rounded Corners 48">
+            <a:extLst>
+              <a:ext uri="{FF2B5EF4-FFF2-40B4-BE49-F238E27FC236}">
+                <a16:creationId xmlns:a16="http://schemas.microsoft.com/office/drawing/2014/main" id="{EEA3C15D-1D95-3984-AD10-08F948D2E867}"/>
+              </a:ext>
+            </a:extLst>
+          </p:cNvPr>
+          <p:cNvSpPr/>
+          <p:nvPr/>
+        </p:nvSpPr>
+        <p:spPr>
+          <a:xfrm>
+            <a:off x="10193000" y="4446160"/>
+            <a:ext cx="360000" cy="360000"/>
+          </a:xfrm>
+          <a:prstGeom prst="roundRect">
+            <a:avLst/>
+          </a:prstGeom>
+          <a:solidFill>
+            <a:srgbClr val="00BFC4"/>
+          </a:solidFill>
+          <a:ln>
+            <a:solidFill>
+              <a:srgbClr val="006D70"/>
+            </a:solidFill>
+          </a:ln>
+        </p:spPr>
+        <p:style>
+          <a:lnRef idx="2">
+            <a:schemeClr val="accent1">
+              <a:shade val="15000"/>
+            </a:schemeClr>
+          </a:lnRef>
+          <a:fillRef idx="1">
+            <a:schemeClr val="accent1"/>
+          </a:fillRef>
+          <a:effectRef idx="0">
+            <a:schemeClr val="accent1"/>
+          </a:effectRef>
+          <a:fontRef idx="minor">
+            <a:schemeClr val="lt1"/>
+          </a:fontRef>
+        </p:style>
+        <p:txBody>
+          <a:bodyPr rtlCol="0" anchor="ctr"/>
+          <a:lstStyle/>
+          <a:p>
+            <a:pPr algn="ctr"/>
+            <a:endParaRPr lang="en-US" dirty="0"/>
+          </a:p>
+        </p:txBody>
+      </p:sp>
+      <mc:AlternateContent xmlns:mc="http://schemas.openxmlformats.org/markup-compatibility/2006">
+        <mc:Choice xmlns:a14="http://schemas.microsoft.com/office/drawing/2010/main" Requires="a14">
+          <p:sp>
+            <p:nvSpPr>
+              <p:cNvPr id="54" name="TextBox 53">
+                <a:extLst>
+                  <a:ext uri="{FF2B5EF4-FFF2-40B4-BE49-F238E27FC236}">
+                    <a16:creationId xmlns:a16="http://schemas.microsoft.com/office/drawing/2014/main" id="{7987BA8C-E0D1-1C00-0995-0DE767F06701}"/>
+                  </a:ext>
+                </a:extLst>
+              </p:cNvPr>
+              <p:cNvSpPr txBox="1"/>
+              <p:nvPr/>
+            </p:nvSpPr>
+            <p:spPr>
+              <a:xfrm>
+                <a:off x="3505324" y="4429485"/>
+                <a:ext cx="2133789" cy="276999"/>
+              </a:xfrm>
+              <a:prstGeom prst="rect">
+                <a:avLst/>
+              </a:prstGeom>
+              <a:noFill/>
+            </p:spPr>
+            <p:txBody>
+              <a:bodyPr wrap="none" lIns="0" tIns="0" rIns="0" bIns="0" rtlCol="0">
+                <a:spAutoFit/>
+              </a:bodyPr>
+              <a:lstStyle/>
+              <a:p>
+                <a:pPr/>
+                <a14:m>
+                  <m:oMathPara xmlns:m="http://schemas.openxmlformats.org/officeDocument/2006/math">
+                    <m:oMathParaPr>
+                      <m:jc m:val="centerGroup"/>
+                    </m:oMathParaPr>
+                    <m:oMath xmlns:m="http://schemas.openxmlformats.org/officeDocument/2006/math">
+                      <m:r>
+                        <a:rPr lang="sv-SE" b="0" i="1" smtClean="0">
+                          <a:latin typeface="Cambria Math" panose="02040503050406030204" pitchFamily="18" charset="0"/>
+                        </a:rPr>
+                        <m:t>𝑑𝑒𝑓𝑒𝑐𝑡𝑠</m:t>
+                      </m:r>
+                      <m:r>
+                        <a:rPr lang="sv-SE" b="0" i="1" smtClean="0">
+                          <a:latin typeface="Cambria Math" panose="02040503050406030204" pitchFamily="18" charset="0"/>
+                        </a:rPr>
+                        <m:t> ~ </m:t>
+                      </m:r>
+                      <m:r>
+                        <a:rPr lang="sv-SE" b="0" i="1" smtClean="0">
+                          <a:latin typeface="Cambria Math" panose="02040503050406030204" pitchFamily="18" charset="0"/>
+                        </a:rPr>
+                        <m:t>𝑡𝑒𝑐h𝑛𝑖𝑞𝑢𝑒</m:t>
+                      </m:r>
+                    </m:oMath>
+                  </m:oMathPara>
+                </a14:m>
+                <a:endParaRPr lang="en-US" dirty="0"/>
+              </a:p>
+            </p:txBody>
+          </p:sp>
+        </mc:Choice>
+        <mc:Fallback>
+          <p:sp>
+            <p:nvSpPr>
+              <p:cNvPr id="54" name="TextBox 53">
+                <a:extLst>
+                  <a:ext uri="{FF2B5EF4-FFF2-40B4-BE49-F238E27FC236}">
+                    <a16:creationId xmlns:a16="http://schemas.microsoft.com/office/drawing/2014/main" id="{7987BA8C-E0D1-1C00-0995-0DE767F06701}"/>
+                  </a:ext>
+                </a:extLst>
+              </p:cNvPr>
+              <p:cNvSpPr txBox="1">
+                <a:spLocks noRot="1" noChangeAspect="1" noMove="1" noResize="1" noEditPoints="1" noAdjustHandles="1" noChangeArrowheads="1" noChangeShapeType="1" noTextEdit="1"/>
+              </p:cNvSpPr>
+              <p:nvPr/>
+            </p:nvSpPr>
+            <p:spPr>
+              <a:xfrm>
+                <a:off x="3505324" y="4429485"/>
+                <a:ext cx="2133789" cy="276999"/>
+              </a:xfrm>
+              <a:prstGeom prst="rect">
+                <a:avLst/>
+              </a:prstGeom>
+              <a:blipFill>
+                <a:blip r:embed="rId11"/>
+                <a:stretch>
+                  <a:fillRect l="-3714" t="-4444" r="-3714" b="-35556"/>
+                </a:stretch>
+              </a:blipFill>
+            </p:spPr>
+            <p:txBody>
+              <a:bodyPr/>
+              <a:lstStyle/>
+              <a:p>
+                <a:r>
+                  <a:rPr lang="en-SE">
+                    <a:noFill/>
+                  </a:rPr>
+                  <a:t> </a:t>
+                </a:r>
+              </a:p>
+            </p:txBody>
+          </p:sp>
+        </mc:Fallback>
+      </mc:AlternateContent>
     </p:spTree>
     <p:extLst>
       <p:ext uri="{BB962C8B-B14F-4D97-AF65-F5344CB8AC3E}">
@@ -14764,7 +16391,7 @@
           <a:p>
             <a:fld id="{B1F82A23-AB26-4EA9-9EE4-DB6F9A4796C6}" type="datetime1">
               <a:rPr lang="de-DE" smtClean="0"/>
-              <a:t>28.04.2025</a:t>
+              <a:t>29.04.2025</a:t>
             </a:fld>
             <a:endParaRPr lang="en-US"/>
           </a:p>
@@ -15091,7 +16718,7 @@
           <a:p>
             <a:fld id="{B1F82A23-AB26-4EA9-9EE4-DB6F9A4796C6}" type="datetime1">
               <a:rPr lang="de-DE" smtClean="0"/>
-              <a:t>28.04.2025</a:t>
+              <a:t>29.04.2025</a:t>
             </a:fld>
             <a:endParaRPr lang="en-US"/>
           </a:p>
@@ -15268,7 +16895,7 @@
           <a:p>
             <a:fld id="{403A2FDA-9B6F-4F19-BB52-15CB2FEB03DD}" type="datetime1">
               <a:rPr lang="de-DE" smtClean="0"/>
-              <a:t>28.04.2025</a:t>
+              <a:t>29.04.2025</a:t>
             </a:fld>
             <a:endParaRPr lang="en-US"/>
           </a:p>
@@ -15412,7 +17039,7 @@
           <a:p>
             <a:fld id="{3DC0E102-9A36-4A87-9A15-82104AF8337B}" type="datetime1">
               <a:rPr lang="de-DE" smtClean="0"/>
-              <a:t>28.04.2025</a:t>
+              <a:t>29.04.2025</a:t>
             </a:fld>
             <a:endParaRPr lang="en-US"/>
           </a:p>
@@ -16286,7 +17913,7 @@
           <a:p>
             <a:fld id="{403A2FDA-9B6F-4F19-BB52-15CB2FEB03DD}" type="datetime1">
               <a:rPr lang="de-DE" smtClean="0"/>
-              <a:t>28.04.2025</a:t>
+              <a:t>29.04.2025</a:t>
             </a:fld>
             <a:endParaRPr lang="en-US"/>
           </a:p>
@@ -16456,7 +18083,7 @@
           <a:p>
             <a:fld id="{403A2FDA-9B6F-4F19-BB52-15CB2FEB03DD}" type="datetime1">
               <a:rPr lang="de-DE" smtClean="0"/>
-              <a:t>28.04.2025</a:t>
+              <a:t>29.04.2025</a:t>
             </a:fld>
             <a:endParaRPr lang="en-US"/>
           </a:p>
@@ -16626,7 +18253,7 @@
           <a:p>
             <a:fld id="{B1F82A23-AB26-4EA9-9EE4-DB6F9A4796C6}" type="datetime1">
               <a:rPr lang="de-DE" smtClean="0"/>
-              <a:t>28.04.2025</a:t>
+              <a:t>29.04.2025</a:t>
             </a:fld>
             <a:endParaRPr lang="en-US"/>
           </a:p>
@@ -16828,7 +18455,7 @@
           <a:p>
             <a:fld id="{B1F82A23-AB26-4EA9-9EE4-DB6F9A4796C6}" type="datetime1">
               <a:rPr lang="de-DE" smtClean="0"/>
-              <a:t>28.04.2025</a:t>
+              <a:t>29.04.2025</a:t>
             </a:fld>
             <a:endParaRPr lang="en-US"/>
           </a:p>
@@ -17267,7 +18894,7 @@
           <a:p>
             <a:fld id="{B1F82A23-AB26-4EA9-9EE4-DB6F9A4796C6}" type="datetime1">
               <a:rPr lang="de-DE" smtClean="0"/>
-              <a:t>28.04.2025</a:t>
+              <a:t>29.04.2025</a:t>
             </a:fld>
             <a:endParaRPr lang="en-US"/>
           </a:p>
@@ -17493,7 +19120,7 @@
           <a:p>
             <a:fld id="{403A2FDA-9B6F-4F19-BB52-15CB2FEB03DD}" type="datetime1">
               <a:rPr lang="de-DE" smtClean="0"/>
-              <a:t>28.04.2025</a:t>
+              <a:t>29.04.2025</a:t>
             </a:fld>
             <a:endParaRPr lang="en-US"/>
           </a:p>
@@ -17673,7 +19300,7 @@
           <a:p>
             <a:fld id="{403A2FDA-9B6F-4F19-BB52-15CB2FEB03DD}" type="datetime1">
               <a:rPr lang="de-DE" smtClean="0"/>
-              <a:t>28.04.2025</a:t>
+              <a:t>29.04.2025</a:t>
             </a:fld>
             <a:endParaRPr lang="en-US"/>
           </a:p>
@@ -19158,7 +20785,7 @@
           <a:p>
             <a:fld id="{403A2FDA-9B6F-4F19-BB52-15CB2FEB03DD}" type="datetime1">
               <a:rPr lang="de-DE" smtClean="0"/>
-              <a:t>28.04.2025</a:t>
+              <a:t>29.04.2025</a:t>
             </a:fld>
             <a:endParaRPr lang="en-US"/>
           </a:p>
@@ -21715,7 +23342,7 @@
           <a:p>
             <a:fld id="{403A2FDA-9B6F-4F19-BB52-15CB2FEB03DD}" type="datetime1">
               <a:rPr lang="de-DE" smtClean="0"/>
-              <a:t>28.04.2025</a:t>
+              <a:t>29.04.2025</a:t>
             </a:fld>
             <a:endParaRPr lang="en-US"/>
           </a:p>
@@ -21885,7 +23512,7 @@
           <a:p>
             <a:fld id="{403A2FDA-9B6F-4F19-BB52-15CB2FEB03DD}" type="datetime1">
               <a:rPr lang="de-DE" smtClean="0"/>
-              <a:t>28.04.2025</a:t>
+              <a:t>29.04.2025</a:t>
             </a:fld>
             <a:endParaRPr lang="en-US"/>
           </a:p>
@@ -22057,7 +23684,7 @@
           <a:p>
             <a:fld id="{403A2FDA-9B6F-4F19-BB52-15CB2FEB03DD}" type="datetime1">
               <a:rPr lang="de-DE" smtClean="0"/>
-              <a:t>28.04.2025</a:t>
+              <a:t>29.04.2025</a:t>
             </a:fld>
             <a:endParaRPr lang="en-US"/>
           </a:p>
@@ -22412,7 +24039,7 @@
           <a:p>
             <a:fld id="{B1F82A23-AB26-4EA9-9EE4-DB6F9A4796C6}" type="datetime1">
               <a:rPr lang="de-DE" smtClean="0"/>
-              <a:t>28.04.2025</a:t>
+              <a:t>29.04.2025</a:t>
             </a:fld>
             <a:endParaRPr lang="en-US"/>
           </a:p>
@@ -22813,7 +24440,7 @@
           <a:p>
             <a:fld id="{403A2FDA-9B6F-4F19-BB52-15CB2FEB03DD}" type="datetime1">
               <a:rPr lang="de-DE" smtClean="0"/>
-              <a:t>28.04.2025</a:t>
+              <a:t>29.04.2025</a:t>
             </a:fld>
             <a:endParaRPr lang="en-US"/>
           </a:p>
@@ -23001,7 +24628,7 @@
           <a:p>
             <a:fld id="{403A2FDA-9B6F-4F19-BB52-15CB2FEB03DD}" type="datetime1">
               <a:rPr lang="de-DE" smtClean="0"/>
-              <a:t>28.04.2025</a:t>
+              <a:t>29.04.2025</a:t>
             </a:fld>
             <a:endParaRPr lang="en-US"/>
           </a:p>
@@ -24063,8 +25690,8 @@
             </p:style>
           </p:cxnSp>
         </p:grpSp>
-        <mc:AlternateContent xmlns:mc="http://schemas.openxmlformats.org/markup-compatibility/2006">
-          <mc:Choice xmlns:a14="http://schemas.microsoft.com/office/drawing/2010/main" Requires="a14">
+        <mc:AlternateContent xmlns:mc="http://schemas.openxmlformats.org/markup-compatibility/2006" xmlns:a14="http://schemas.microsoft.com/office/drawing/2010/main">
+          <mc:Choice Requires="a14">
             <p:sp>
               <p:nvSpPr>
                 <p:cNvPr id="54" name="TextBox 53">
@@ -24093,6 +25720,7 @@
                 </a:bodyPr>
                 <a:lstStyle/>
                 <a:p>
+                  <a:pPr/>
                   <a14:m>
                     <m:oMathPara xmlns:m="http://schemas.openxmlformats.org/officeDocument/2006/math">
                       <m:oMathParaPr>
@@ -24137,7 +25765,7 @@
               </p:txBody>
             </p:sp>
           </mc:Choice>
-          <mc:Fallback>
+          <mc:Fallback xmlns="">
             <p:sp>
               <p:nvSpPr>
                 <p:cNvPr id="54" name="TextBox 53">
@@ -24500,8 +26128,8 @@
             </p:style>
           </p:cxnSp>
         </p:grpSp>
-        <mc:AlternateContent xmlns:mc="http://schemas.openxmlformats.org/markup-compatibility/2006">
-          <mc:Choice xmlns:a14="http://schemas.microsoft.com/office/drawing/2010/main" Requires="a14">
+        <mc:AlternateContent xmlns:mc="http://schemas.openxmlformats.org/markup-compatibility/2006" xmlns:a14="http://schemas.microsoft.com/office/drawing/2010/main">
+          <mc:Choice Requires="a14">
             <p:sp>
               <p:nvSpPr>
                 <p:cNvPr id="55" name="TextBox 54">
@@ -24530,6 +26158,7 @@
                 </a:bodyPr>
                 <a:lstStyle/>
                 <a:p>
+                  <a:pPr/>
                   <a14:m>
                     <m:oMathPara xmlns:m="http://schemas.openxmlformats.org/officeDocument/2006/math">
                       <m:oMathParaPr>
@@ -24562,7 +26191,7 @@
               </p:txBody>
             </p:sp>
           </mc:Choice>
-          <mc:Fallback>
+          <mc:Fallback xmlns="">
             <p:sp>
               <p:nvSpPr>
                 <p:cNvPr id="55" name="TextBox 54">
@@ -24629,10 +26258,68 @@
             <a:avLst/>
           </a:prstGeom>
           <a:solidFill>
-            <a:schemeClr val="tx2">
-              <a:lumMod val="10000"/>
-              <a:lumOff val="90000"/>
+            <a:schemeClr val="bg1"/>
+          </a:solidFill>
+          <a:ln>
+            <a:solidFill>
+              <a:srgbClr val="006D70"/>
+            </a:solidFill>
+          </a:ln>
+          <a:effectLst>
+            <a:innerShdw blurRad="63500" dist="50800" dir="13500000">
+              <a:prstClr val="black">
+                <a:alpha val="50000"/>
+              </a:prstClr>
+            </a:innerShdw>
+          </a:effectLst>
+        </p:spPr>
+        <p:style>
+          <a:lnRef idx="2">
+            <a:schemeClr val="accent1">
+              <a:shade val="15000"/>
             </a:schemeClr>
+          </a:lnRef>
+          <a:fillRef idx="1">
+            <a:schemeClr val="accent1"/>
+          </a:fillRef>
+          <a:effectRef idx="0">
+            <a:schemeClr val="accent1"/>
+          </a:effectRef>
+          <a:fontRef idx="minor">
+            <a:schemeClr val="lt1"/>
+          </a:fontRef>
+        </p:style>
+        <p:txBody>
+          <a:bodyPr rtlCol="0" anchor="ctr"/>
+          <a:lstStyle/>
+          <a:p>
+            <a:pPr algn="ctr"/>
+            <a:endParaRPr lang="en-SE"/>
+          </a:p>
+        </p:txBody>
+      </p:sp>
+      <p:sp>
+        <p:nvSpPr>
+          <p:cNvPr id="65" name="Rectangle 64">
+            <a:extLst>
+              <a:ext uri="{FF2B5EF4-FFF2-40B4-BE49-F238E27FC236}">
+                <a16:creationId xmlns:a16="http://schemas.microsoft.com/office/drawing/2014/main" id="{AE443B7F-4C93-1D72-C328-9123B6BA7969}"/>
+              </a:ext>
+            </a:extLst>
+          </p:cNvPr>
+          <p:cNvSpPr/>
+          <p:nvPr/>
+        </p:nvSpPr>
+        <p:spPr>
+          <a:xfrm>
+            <a:off x="6096000" y="4264572"/>
+            <a:ext cx="2017987" cy="915842"/>
+          </a:xfrm>
+          <a:prstGeom prst="rect">
+            <a:avLst/>
+          </a:prstGeom>
+          <a:solidFill>
+            <a:schemeClr val="bg1"/>
           </a:solidFill>
           <a:ln>
             <a:solidFill>
@@ -24677,10 +26364,10 @@
       </p:sp>
       <p:sp>
         <p:nvSpPr>
-          <p:cNvPr id="65" name="Rectangle 64">
-            <a:extLst>
-              <a:ext uri="{FF2B5EF4-FFF2-40B4-BE49-F238E27FC236}">
-                <a16:creationId xmlns:a16="http://schemas.microsoft.com/office/drawing/2014/main" id="{AE443B7F-4C93-1D72-C328-9123B6BA7969}"/>
+          <p:cNvPr id="68" name="Rectangle 67">
+            <a:extLst>
+              <a:ext uri="{FF2B5EF4-FFF2-40B4-BE49-F238E27FC236}">
+                <a16:creationId xmlns:a16="http://schemas.microsoft.com/office/drawing/2014/main" id="{E2026D1F-9960-7308-A9AE-B01BA89A66A7}"/>
               </a:ext>
             </a:extLst>
           </p:cNvPr>
@@ -24689,17 +26376,14 @@
         </p:nvSpPr>
         <p:spPr>
           <a:xfrm>
-            <a:off x="6096000" y="4264572"/>
+            <a:off x="3860301" y="5307905"/>
             <a:ext cx="2017987" cy="915842"/>
           </a:xfrm>
           <a:prstGeom prst="rect">
             <a:avLst/>
           </a:prstGeom>
           <a:solidFill>
-            <a:schemeClr val="accent2">
-              <a:lumMod val="20000"/>
-              <a:lumOff val="80000"/>
-            </a:schemeClr>
+            <a:schemeClr val="bg1"/>
           </a:solidFill>
           <a:ln>
             <a:solidFill>
@@ -24744,10 +26428,10 @@
       </p:sp>
       <p:sp>
         <p:nvSpPr>
-          <p:cNvPr id="68" name="Rectangle 67">
-            <a:extLst>
-              <a:ext uri="{FF2B5EF4-FFF2-40B4-BE49-F238E27FC236}">
-                <a16:creationId xmlns:a16="http://schemas.microsoft.com/office/drawing/2014/main" id="{E2026D1F-9960-7308-A9AE-B01BA89A66A7}"/>
+          <p:cNvPr id="69" name="Rectangle 68">
+            <a:extLst>
+              <a:ext uri="{FF2B5EF4-FFF2-40B4-BE49-F238E27FC236}">
+                <a16:creationId xmlns:a16="http://schemas.microsoft.com/office/drawing/2014/main" id="{F4EEA625-4A18-2999-A24B-CB8E0CC8FC1C}"/>
               </a:ext>
             </a:extLst>
           </p:cNvPr>
@@ -24756,24 +26440,18 @@
         </p:nvSpPr>
         <p:spPr>
           <a:xfrm>
-            <a:off x="3860301" y="5307905"/>
+            <a:off x="6096000" y="5307905"/>
             <a:ext cx="2017987" cy="915842"/>
           </a:xfrm>
           <a:prstGeom prst="rect">
             <a:avLst/>
           </a:prstGeom>
           <a:solidFill>
-            <a:schemeClr val="accent2">
-              <a:lumMod val="20000"/>
-              <a:lumOff val="80000"/>
-            </a:schemeClr>
+            <a:schemeClr val="bg1"/>
           </a:solidFill>
           <a:ln>
             <a:solidFill>
-              <a:schemeClr val="tx1">
-                <a:lumMod val="50000"/>
-                <a:lumOff val="50000"/>
-              </a:schemeClr>
+              <a:srgbClr val="006D70"/>
             </a:solidFill>
           </a:ln>
           <a:effectLst>
@@ -24811,73 +26489,6 @@
       </p:sp>
       <p:sp>
         <p:nvSpPr>
-          <p:cNvPr id="69" name="Rectangle 68">
-            <a:extLst>
-              <a:ext uri="{FF2B5EF4-FFF2-40B4-BE49-F238E27FC236}">
-                <a16:creationId xmlns:a16="http://schemas.microsoft.com/office/drawing/2014/main" id="{F4EEA625-4A18-2999-A24B-CB8E0CC8FC1C}"/>
-              </a:ext>
-            </a:extLst>
-          </p:cNvPr>
-          <p:cNvSpPr/>
-          <p:nvPr/>
-        </p:nvSpPr>
-        <p:spPr>
-          <a:xfrm>
-            <a:off x="6096000" y="5307905"/>
-            <a:ext cx="2017987" cy="915842"/>
-          </a:xfrm>
-          <a:prstGeom prst="rect">
-            <a:avLst/>
-          </a:prstGeom>
-          <a:solidFill>
-            <a:schemeClr val="tx2">
-              <a:lumMod val="10000"/>
-              <a:lumOff val="90000"/>
-            </a:schemeClr>
-          </a:solidFill>
-          <a:ln>
-            <a:solidFill>
-              <a:schemeClr val="tx1">
-                <a:lumMod val="50000"/>
-                <a:lumOff val="50000"/>
-              </a:schemeClr>
-            </a:solidFill>
-          </a:ln>
-          <a:effectLst>
-            <a:innerShdw blurRad="63500" dist="50800" dir="13500000">
-              <a:prstClr val="black">
-                <a:alpha val="50000"/>
-              </a:prstClr>
-            </a:innerShdw>
-          </a:effectLst>
-        </p:spPr>
-        <p:style>
-          <a:lnRef idx="2">
-            <a:schemeClr val="accent1">
-              <a:shade val="15000"/>
-            </a:schemeClr>
-          </a:lnRef>
-          <a:fillRef idx="1">
-            <a:schemeClr val="accent1"/>
-          </a:fillRef>
-          <a:effectRef idx="0">
-            <a:schemeClr val="accent1"/>
-          </a:effectRef>
-          <a:fontRef idx="minor">
-            <a:schemeClr val="lt1"/>
-          </a:fontRef>
-        </p:style>
-        <p:txBody>
-          <a:bodyPr rtlCol="0" anchor="ctr"/>
-          <a:lstStyle/>
-          <a:p>
-            <a:pPr algn="ctr"/>
-            <a:endParaRPr lang="en-SE"/>
-          </a:p>
-        </p:txBody>
-      </p:sp>
-      <p:sp>
-        <p:nvSpPr>
           <p:cNvPr id="72" name="TextBox 71">
             <a:extLst>
               <a:ext uri="{FF2B5EF4-FFF2-40B4-BE49-F238E27FC236}">
@@ -24963,8 +26574,8 @@
         </p:nvSpPr>
         <p:spPr>
           <a:xfrm>
-            <a:off x="2312194" y="4214835"/>
-            <a:ext cx="5879306" cy="1031057"/>
+            <a:off x="2312194" y="4214836"/>
+            <a:ext cx="9594558" cy="1004500"/>
           </a:xfrm>
           <a:prstGeom prst="rect">
             <a:avLst/>
@@ -24996,28 +26607,335 @@
           </a:p>
         </p:txBody>
       </p:sp>
-      <p:sp>
-        <p:nvSpPr>
-          <p:cNvPr id="75" name="TextBox 74">
-            <a:extLst>
-              <a:ext uri="{FF2B5EF4-FFF2-40B4-BE49-F238E27FC236}">
-                <a16:creationId xmlns:a16="http://schemas.microsoft.com/office/drawing/2014/main" id="{B3BCC7D0-B229-B1B8-6F4F-500C2527B55B}"/>
-              </a:ext>
-            </a:extLst>
-          </p:cNvPr>
-          <p:cNvSpPr txBox="1"/>
+      <p:pic>
+        <p:nvPicPr>
+          <p:cNvPr id="30" name="Picture 29">
+            <a:extLst>
+              <a:ext uri="{FF2B5EF4-FFF2-40B4-BE49-F238E27FC236}">
+                <a16:creationId xmlns:a16="http://schemas.microsoft.com/office/drawing/2014/main" id="{1F300AB5-73A6-EA9F-39D2-3F2FB395E262}"/>
+              </a:ext>
+            </a:extLst>
+          </p:cNvPr>
+          <p:cNvPicPr>
+            <a:picLocks noChangeAspect="1"/>
+          </p:cNvPicPr>
           <p:nvPr/>
-        </p:nvSpPr>
+        </p:nvPicPr>
+        <p:blipFill>
+          <a:blip r:embed="rId4">
+            <a:extLst>
+              <a:ext uri="{28A0092B-C50C-407E-A947-70E740481C1C}">
+                <a14:useLocalDpi xmlns:a14="http://schemas.microsoft.com/office/drawing/2010/main" val="0"/>
+              </a:ext>
+            </a:extLst>
+          </a:blip>
+          <a:stretch>
+            <a:fillRect/>
+          </a:stretch>
+        </p:blipFill>
         <p:spPr>
           <a:xfrm>
-            <a:off x="8629207" y="5105058"/>
-            <a:ext cx="2955318" cy="954107"/>
+            <a:off x="4183503" y="4317459"/>
+            <a:ext cx="1371581" cy="822948"/>
+          </a:xfrm>
+          <a:prstGeom prst="rect">
+            <a:avLst/>
+          </a:prstGeom>
+        </p:spPr>
+      </p:pic>
+      <p:pic>
+        <p:nvPicPr>
+          <p:cNvPr id="32" name="Picture 31">
+            <a:extLst>
+              <a:ext uri="{FF2B5EF4-FFF2-40B4-BE49-F238E27FC236}">
+                <a16:creationId xmlns:a16="http://schemas.microsoft.com/office/drawing/2014/main" id="{6033A919-20D8-9235-E6FA-5989F596B972}"/>
+              </a:ext>
+            </a:extLst>
+          </p:cNvPr>
+          <p:cNvPicPr>
+            <a:picLocks noChangeAspect="1"/>
+          </p:cNvPicPr>
+          <p:nvPr/>
+        </p:nvPicPr>
+        <p:blipFill>
+          <a:blip r:embed="rId2">
+            <a:extLst>
+              <a:ext uri="{28A0092B-C50C-407E-A947-70E740481C1C}">
+                <a14:useLocalDpi xmlns:a14="http://schemas.microsoft.com/office/drawing/2010/main" val="0"/>
+              </a:ext>
+            </a:extLst>
+          </a:blip>
+          <a:stretch>
+            <a:fillRect/>
+          </a:stretch>
+        </p:blipFill>
+        <p:spPr>
+          <a:xfrm>
+            <a:off x="6416656" y="5625218"/>
+            <a:ext cx="1380901" cy="552360"/>
+          </a:xfrm>
+          <a:prstGeom prst="rect">
+            <a:avLst/>
+          </a:prstGeom>
+        </p:spPr>
+      </p:pic>
+      <p:pic>
+        <p:nvPicPr>
+          <p:cNvPr id="34" name="Picture 33">
+            <a:extLst>
+              <a:ext uri="{FF2B5EF4-FFF2-40B4-BE49-F238E27FC236}">
+                <a16:creationId xmlns:a16="http://schemas.microsoft.com/office/drawing/2014/main" id="{34A7BD46-491C-A30A-6375-6E9A63F15A7E}"/>
+              </a:ext>
+            </a:extLst>
+          </p:cNvPr>
+          <p:cNvPicPr>
+            <a:picLocks noChangeAspect="1"/>
+          </p:cNvPicPr>
+          <p:nvPr/>
+        </p:nvPicPr>
+        <p:blipFill>
+          <a:blip r:embed="rId5">
+            <a:extLst>
+              <a:ext uri="{28A0092B-C50C-407E-A947-70E740481C1C}">
+                <a14:useLocalDpi xmlns:a14="http://schemas.microsoft.com/office/drawing/2010/main" val="0"/>
+              </a:ext>
+            </a:extLst>
+          </a:blip>
+          <a:stretch>
+            <a:fillRect/>
+          </a:stretch>
+        </p:blipFill>
+        <p:spPr>
+          <a:xfrm>
+            <a:off x="6416656" y="4588837"/>
+            <a:ext cx="1376674" cy="550669"/>
+          </a:xfrm>
+          <a:prstGeom prst="rect">
+            <a:avLst/>
+          </a:prstGeom>
+        </p:spPr>
+      </p:pic>
+      <p:pic>
+        <p:nvPicPr>
+          <p:cNvPr id="36" name="Picture 35">
+            <a:extLst>
+              <a:ext uri="{FF2B5EF4-FFF2-40B4-BE49-F238E27FC236}">
+                <a16:creationId xmlns:a16="http://schemas.microsoft.com/office/drawing/2014/main" id="{FD491319-3730-EAEB-7F7A-740B45F853B2}"/>
+              </a:ext>
+            </a:extLst>
+          </p:cNvPr>
+          <p:cNvPicPr>
+            <a:picLocks noChangeAspect="1"/>
+          </p:cNvPicPr>
+          <p:nvPr/>
+        </p:nvPicPr>
+        <p:blipFill>
+          <a:blip r:embed="rId6">
+            <a:extLst>
+              <a:ext uri="{28A0092B-C50C-407E-A947-70E740481C1C}">
+                <a14:useLocalDpi xmlns:a14="http://schemas.microsoft.com/office/drawing/2010/main" val="0"/>
+              </a:ext>
+            </a:extLst>
+          </a:blip>
+          <a:stretch>
+            <a:fillRect/>
+          </a:stretch>
+        </p:blipFill>
+        <p:spPr>
+          <a:xfrm>
+            <a:off x="4183505" y="5354631"/>
+            <a:ext cx="1371579" cy="822947"/>
+          </a:xfrm>
+          <a:prstGeom prst="rect">
+            <a:avLst/>
+          </a:prstGeom>
+        </p:spPr>
+      </p:pic>
+      <p:grpSp>
+        <p:nvGrpSpPr>
+          <p:cNvPr id="37" name="Group 36">
+            <a:extLst>
+              <a:ext uri="{FF2B5EF4-FFF2-40B4-BE49-F238E27FC236}">
+                <a16:creationId xmlns:a16="http://schemas.microsoft.com/office/drawing/2014/main" id="{BE777473-7ECB-9C8A-A93C-0693D4C15A0C}"/>
+              </a:ext>
+            </a:extLst>
+          </p:cNvPr>
+          <p:cNvGrpSpPr/>
+          <p:nvPr/>
+        </p:nvGrpSpPr>
+        <p:grpSpPr>
+          <a:xfrm>
+            <a:off x="7904392" y="2887555"/>
+            <a:ext cx="4559103" cy="946595"/>
+            <a:chOff x="775412" y="5230368"/>
+            <a:chExt cx="4559103" cy="946595"/>
+          </a:xfrm>
+        </p:grpSpPr>
+        <p:sp>
+          <p:nvSpPr>
+            <p:cNvPr id="46" name="Rectangle: Rounded Corners 45">
+              <a:extLst>
+                <a:ext uri="{FF2B5EF4-FFF2-40B4-BE49-F238E27FC236}">
+                  <a16:creationId xmlns:a16="http://schemas.microsoft.com/office/drawing/2014/main" id="{7CE16B59-BC59-3B38-54B2-9147B5EE2EA3}"/>
+                </a:ext>
+              </a:extLst>
+            </p:cNvPr>
+            <p:cNvSpPr/>
+            <p:nvPr/>
+          </p:nvSpPr>
+          <p:spPr>
+            <a:xfrm>
+              <a:off x="775412" y="5230368"/>
+              <a:ext cx="4559103" cy="946595"/>
+            </a:xfrm>
+            <a:prstGeom prst="roundRect">
+              <a:avLst/>
+            </a:prstGeom>
+            <a:effectLst>
+              <a:outerShdw blurRad="50800" dist="38100" dir="2700000" algn="tl" rotWithShape="0">
+                <a:prstClr val="black">
+                  <a:alpha val="40000"/>
+                </a:prstClr>
+              </a:outerShdw>
+            </a:effectLst>
+          </p:spPr>
+          <p:style>
+            <a:lnRef idx="2">
+              <a:schemeClr val="accent1">
+                <a:shade val="15000"/>
+              </a:schemeClr>
+            </a:lnRef>
+            <a:fillRef idx="1">
+              <a:schemeClr val="accent1"/>
+            </a:fillRef>
+            <a:effectRef idx="0">
+              <a:schemeClr val="accent1"/>
+            </a:effectRef>
+            <a:fontRef idx="minor">
+              <a:schemeClr val="lt1"/>
+            </a:fontRef>
+          </p:style>
+          <p:txBody>
+            <a:bodyPr lIns="612000" rtlCol="0" anchor="ctr"/>
+            <a:lstStyle/>
+            <a:p>
+              <a:r>
+                <a:rPr lang="en-US" sz="1400" dirty="0">
+                  <a:solidFill>
+                    <a:schemeClr val="bg1"/>
+                  </a:solidFill>
+                </a:rPr>
+                <a:t>Depending on the observed change in results, you can infer which assumed causal model describes the data creation process best </a:t>
+              </a:r>
+            </a:p>
+          </p:txBody>
+        </p:sp>
+        <p:pic>
+          <p:nvPicPr>
+            <p:cNvPr id="52" name="Graphic 51" descr="Open quotation mark with solid fill">
+              <a:extLst>
+                <a:ext uri="{FF2B5EF4-FFF2-40B4-BE49-F238E27FC236}">
+                  <a16:creationId xmlns:a16="http://schemas.microsoft.com/office/drawing/2014/main" id="{97CFE505-EFCF-2ABE-7320-8B2E3B14497A}"/>
+                </a:ext>
+              </a:extLst>
+            </p:cNvPr>
+            <p:cNvPicPr>
+              <a:picLocks noChangeAspect="1"/>
+            </p:cNvPicPr>
+            <p:nvPr/>
+          </p:nvPicPr>
+          <p:blipFill>
+            <a:blip r:embed="rId7">
+              <a:extLst>
+                <a:ext uri="{96DAC541-7B7A-43D3-8B79-37D633B846F1}">
+                  <asvg:svgBlip xmlns:asvg="http://schemas.microsoft.com/office/drawing/2016/SVG/main" r:embed="rId8"/>
+                </a:ext>
+              </a:extLst>
+            </a:blip>
+            <a:stretch>
+              <a:fillRect/>
+            </a:stretch>
+          </p:blipFill>
+          <p:spPr>
+            <a:xfrm rot="10800000">
+              <a:off x="775412" y="5343665"/>
+              <a:ext cx="720000" cy="720000"/>
+            </a:xfrm>
+            <a:prstGeom prst="rect">
+              <a:avLst/>
+            </a:prstGeom>
+          </p:spPr>
+        </p:pic>
+      </p:grpSp>
+      <p:sp>
+        <p:nvSpPr>
+          <p:cNvPr id="56" name="Rectangle 55">
+            <a:extLst>
+              <a:ext uri="{FF2B5EF4-FFF2-40B4-BE49-F238E27FC236}">
+                <a16:creationId xmlns:a16="http://schemas.microsoft.com/office/drawing/2014/main" id="{37B8BFFF-87AC-C706-FF62-DA93BDA4EF93}"/>
+              </a:ext>
+            </a:extLst>
+          </p:cNvPr>
+          <p:cNvSpPr/>
+          <p:nvPr/>
+        </p:nvSpPr>
+        <p:spPr>
+          <a:xfrm>
+            <a:off x="2312194" y="5265505"/>
+            <a:ext cx="9594558" cy="1011015"/>
           </a:xfrm>
           <a:prstGeom prst="rect">
             <a:avLst/>
           </a:prstGeom>
           <a:noFill/>
         </p:spPr>
+        <p:style>
+          <a:lnRef idx="2">
+            <a:schemeClr val="accent1">
+              <a:shade val="15000"/>
+            </a:schemeClr>
+          </a:lnRef>
+          <a:fillRef idx="1">
+            <a:schemeClr val="accent1"/>
+          </a:fillRef>
+          <a:effectRef idx="0">
+            <a:schemeClr val="accent1"/>
+          </a:effectRef>
+          <a:fontRef idx="minor">
+            <a:schemeClr val="lt1"/>
+          </a:fontRef>
+        </p:style>
+        <p:txBody>
+          <a:bodyPr rtlCol="0" anchor="ctr"/>
+          <a:lstStyle/>
+          <a:p>
+            <a:pPr algn="ctr"/>
+            <a:endParaRPr lang="en-SE"/>
+          </a:p>
+        </p:txBody>
+      </p:sp>
+      <p:sp>
+        <p:nvSpPr>
+          <p:cNvPr id="57" name="TextBox 56">
+            <a:extLst>
+              <a:ext uri="{FF2B5EF4-FFF2-40B4-BE49-F238E27FC236}">
+                <a16:creationId xmlns:a16="http://schemas.microsoft.com/office/drawing/2014/main" id="{9F1426DC-02B0-FFB4-2B8A-2BE467B50B73}"/>
+              </a:ext>
+            </a:extLst>
+          </p:cNvPr>
+          <p:cNvSpPr txBox="1"/>
+          <p:nvPr/>
+        </p:nvSpPr>
+        <p:spPr>
+          <a:xfrm>
+            <a:off x="8264392" y="4248491"/>
+            <a:ext cx="3642360" cy="923330"/>
+          </a:xfrm>
+          <a:prstGeom prst="rect">
+            <a:avLst/>
+          </a:prstGeom>
+          <a:noFill/>
+        </p:spPr>
         <p:txBody>
           <a:bodyPr wrap="square" rtlCol="0">
             <a:spAutoFit/>
@@ -25025,62 +26943,57 @@
           <a:lstStyle/>
           <a:p>
             <a:r>
-              <a:rPr lang="en-US" sz="1400" dirty="0">
-                <a:solidFill>
-                  <a:schemeClr val="tx2">
-                    <a:lumMod val="75000"/>
-                    <a:lumOff val="25000"/>
-                  </a:schemeClr>
-                </a:solidFill>
-              </a:rPr>
-              <a:t>Depending on the observed change in results, you can infer which assumed causal model describes the data creation process best </a:t>
-            </a:r>
-          </a:p>
-        </p:txBody>
-      </p:sp>
-      <p:cxnSp>
-        <p:nvCxnSpPr>
-          <p:cNvPr id="76" name="Connector: Curved 75">
-            <a:extLst>
-              <a:ext uri="{FF2B5EF4-FFF2-40B4-BE49-F238E27FC236}">
-                <a16:creationId xmlns:a16="http://schemas.microsoft.com/office/drawing/2014/main" id="{99108B8A-4A3C-11C4-FBE2-34C9168FA2B8}"/>
-              </a:ext>
-            </a:extLst>
-          </p:cNvPr>
-          <p:cNvCxnSpPr>
-            <a:cxnSpLocks/>
-            <a:stCxn id="75" idx="0"/>
-            <a:endCxn id="74" idx="3"/>
-          </p:cNvCxnSpPr>
+              <a:rPr lang="en-GB" dirty="0"/>
+              <a:t>If the effect of x on y changes when including z, then z has a causal effect on y.</a:t>
+            </a:r>
+            <a:endParaRPr lang="en-SE" dirty="0"/>
+          </a:p>
+        </p:txBody>
+      </p:sp>
+      <p:sp>
+        <p:nvSpPr>
+          <p:cNvPr id="58" name="TextBox 57">
+            <a:extLst>
+              <a:ext uri="{FF2B5EF4-FFF2-40B4-BE49-F238E27FC236}">
+                <a16:creationId xmlns:a16="http://schemas.microsoft.com/office/drawing/2014/main" id="{8C623247-307A-03F0-6E5F-E6F6D2E98CBE}"/>
+              </a:ext>
+            </a:extLst>
+          </p:cNvPr>
+          <p:cNvSpPr txBox="1"/>
           <p:nvPr/>
-        </p:nvCxnSpPr>
+        </p:nvSpPr>
         <p:spPr>
-          <a:xfrm rot="16200000" flipV="1">
-            <a:off x="8961836" y="3960028"/>
-            <a:ext cx="374694" cy="1915366"/>
+          <a:xfrm>
+            <a:off x="8264392" y="5317788"/>
+            <a:ext cx="3642360" cy="923330"/>
           </a:xfrm>
-          <a:prstGeom prst="curvedConnector2">
+          <a:prstGeom prst="rect">
             <a:avLst/>
           </a:prstGeom>
-          <a:ln>
-            <a:tailEnd type="triangle"/>
-          </a:ln>
+          <a:noFill/>
         </p:spPr>
-        <p:style>
-          <a:lnRef idx="2">
-            <a:schemeClr val="accent1"/>
-          </a:lnRef>
-          <a:fillRef idx="0">
-            <a:schemeClr val="accent1"/>
-          </a:fillRef>
-          <a:effectRef idx="1">
-            <a:schemeClr val="accent1"/>
-          </a:effectRef>
-          <a:fontRef idx="minor">
-            <a:schemeClr val="tx1"/>
-          </a:fontRef>
-        </p:style>
-      </p:cxnSp>
+        <p:txBody>
+          <a:bodyPr wrap="square" rtlCol="0">
+            <a:spAutoFit/>
+          </a:bodyPr>
+          <a:lstStyle/>
+          <a:p>
+            <a:r>
+              <a:rPr lang="en-GB" dirty="0"/>
+              <a:t>If the effect of x on y does not when including z, then z has </a:t>
+            </a:r>
+            <a:r>
+              <a:rPr lang="en-GB" b="1" dirty="0"/>
+              <a:t>no</a:t>
+            </a:r>
+            <a:r>
+              <a:rPr lang="en-GB" dirty="0"/>
+              <a:t> causal effect on y.</a:t>
+            </a:r>
+            <a:endParaRPr lang="en-SE" dirty="0"/>
+          </a:p>
+        </p:txBody>
+      </p:sp>
     </p:spTree>
     <p:extLst>
       <p:ext uri="{BB962C8B-B14F-4D97-AF65-F5344CB8AC3E}">
@@ -25267,7 +27180,7 @@
           <a:p>
             <a:fld id="{403A2FDA-9B6F-4F19-BB52-15CB2FEB03DD}" type="datetime1">
               <a:rPr lang="de-DE" smtClean="0"/>
-              <a:t>28.04.2025</a:t>
+              <a:t>29.04.2025</a:t>
             </a:fld>
             <a:endParaRPr lang="en-US"/>
           </a:p>
@@ -25469,7 +27382,7 @@
           <a:p>
             <a:fld id="{B1F82A23-AB26-4EA9-9EE4-DB6F9A4796C6}" type="datetime1">
               <a:rPr lang="de-DE" smtClean="0"/>
-              <a:t>28.04.2025</a:t>
+              <a:t>29.04.2025</a:t>
             </a:fld>
             <a:endParaRPr lang="en-US"/>
           </a:p>
@@ -25613,7 +27526,7 @@
           <a:p>
             <a:fld id="{B1F82A23-AB26-4EA9-9EE4-DB6F9A4796C6}" type="datetime1">
               <a:rPr lang="de-DE" smtClean="0"/>
-              <a:t>28.04.2025</a:t>
+              <a:t>29.04.2025</a:t>
             </a:fld>
             <a:endParaRPr lang="en-US"/>
           </a:p>
@@ -26638,8 +28551,8 @@
           </p:style>
         </p:cxnSp>
       </p:grpSp>
-      <mc:AlternateContent xmlns:mc="http://schemas.openxmlformats.org/markup-compatibility/2006">
-        <mc:Choice xmlns:a14="http://schemas.microsoft.com/office/drawing/2010/main" Requires="a14">
+      <mc:AlternateContent xmlns:mc="http://schemas.openxmlformats.org/markup-compatibility/2006" xmlns:a14="http://schemas.microsoft.com/office/drawing/2010/main">
+        <mc:Choice Requires="a14">
           <p:sp>
             <p:nvSpPr>
               <p:cNvPr id="31" name="TextBox 30">
@@ -26668,6 +28581,7 @@
               </a:bodyPr>
               <a:lstStyle/>
               <a:p>
+                <a:pPr/>
                 <a14:m>
                   <m:oMathPara xmlns:m="http://schemas.openxmlformats.org/officeDocument/2006/math">
                     <m:oMathParaPr>
@@ -26712,7 +28626,7 @@
             </p:txBody>
           </p:sp>
         </mc:Choice>
-        <mc:Fallback>
+        <mc:Fallback xmlns="">
           <p:sp>
             <p:nvSpPr>
               <p:cNvPr id="31" name="TextBox 30">
@@ -26945,7 +28859,7 @@
           <a:p>
             <a:fld id="{403A2FDA-9B6F-4F19-BB52-15CB2FEB03DD}" type="datetime1">
               <a:rPr lang="de-DE" smtClean="0"/>
-              <a:t>28.04.2025</a:t>
+              <a:t>29.04.2025</a:t>
             </a:fld>
             <a:endParaRPr lang="en-US"/>
           </a:p>
@@ -27118,7 +29032,7 @@
           <a:p>
             <a:fld id="{B1F82A23-AB26-4EA9-9EE4-DB6F9A4796C6}" type="datetime1">
               <a:rPr lang="de-DE" smtClean="0"/>
-              <a:t>28.04.2025</a:t>
+              <a:t>29.04.2025</a:t>
             </a:fld>
             <a:endParaRPr lang="en-US"/>
           </a:p>
@@ -27293,7 +29207,7 @@
           <a:p>
             <a:fld id="{B1F82A23-AB26-4EA9-9EE4-DB6F9A4796C6}" type="datetime1">
               <a:rPr lang="de-DE" smtClean="0"/>
-              <a:t>28.04.2025</a:t>
+              <a:t>29.04.2025</a:t>
             </a:fld>
             <a:endParaRPr lang="en-US"/>
           </a:p>
@@ -27527,7 +29441,7 @@
           <a:p>
             <a:fld id="{B1F82A23-AB26-4EA9-9EE4-DB6F9A4796C6}" type="datetime1">
               <a:rPr lang="de-DE" smtClean="0"/>
-              <a:t>28.04.2025</a:t>
+              <a:t>29.04.2025</a:t>
             </a:fld>
             <a:endParaRPr lang="en-US"/>
           </a:p>
@@ -27732,7 +29646,7 @@
           <a:p>
             <a:fld id="{B1F82A23-AB26-4EA9-9EE4-DB6F9A4796C6}" type="datetime1">
               <a:rPr lang="de-DE" smtClean="0"/>
-              <a:t>28.04.2025</a:t>
+              <a:t>29.04.2025</a:t>
             </a:fld>
             <a:endParaRPr lang="en-US" dirty="0"/>
           </a:p>
@@ -29019,7 +30933,7 @@
           <a:p>
             <a:fld id="{403A2FDA-9B6F-4F19-BB52-15CB2FEB03DD}" type="datetime1">
               <a:rPr lang="de-DE" smtClean="0"/>
-              <a:t>28.04.2025</a:t>
+              <a:t>29.04.2025</a:t>
             </a:fld>
             <a:endParaRPr lang="en-US"/>
           </a:p>
@@ -29334,7 +31248,7 @@
           <a:p>
             <a:fld id="{B1F82A23-AB26-4EA9-9EE4-DB6F9A4796C6}" type="datetime1">
               <a:rPr lang="de-DE" smtClean="0"/>
-              <a:t>28.04.2025</a:t>
+              <a:t>29.04.2025</a:t>
             </a:fld>
             <a:endParaRPr lang="en-US"/>
           </a:p>
@@ -29547,7 +31461,7 @@
           <a:p>
             <a:fld id="{403A2FDA-9B6F-4F19-BB52-15CB2FEB03DD}" type="datetime1">
               <a:rPr lang="de-DE" smtClean="0"/>
-              <a:t>28.04.2025</a:t>
+              <a:t>29.04.2025</a:t>
             </a:fld>
             <a:endParaRPr lang="en-US"/>
           </a:p>
@@ -29719,7 +31633,7 @@
           <a:p>
             <a:fld id="{B1F82A23-AB26-4EA9-9EE4-DB6F9A4796C6}" type="datetime1">
               <a:rPr lang="de-DE" smtClean="0"/>
-              <a:t>28.04.2025</a:t>
+              <a:t>29.04.2025</a:t>
             </a:fld>
             <a:endParaRPr lang="en-US"/>
           </a:p>
@@ -29889,7 +31803,7 @@
           <a:p>
             <a:fld id="{B1F82A23-AB26-4EA9-9EE4-DB6F9A4796C6}" type="datetime1">
               <a:rPr lang="de-DE" smtClean="0"/>
-              <a:t>28.04.2025</a:t>
+              <a:t>29.04.2025</a:t>
             </a:fld>
             <a:endParaRPr lang="en-US"/>
           </a:p>
@@ -30059,7 +31973,7 @@
           <a:p>
             <a:fld id="{403A2FDA-9B6F-4F19-BB52-15CB2FEB03DD}" type="datetime1">
               <a:rPr lang="de-DE" smtClean="0"/>
-              <a:t>28.04.2025</a:t>
+              <a:t>29.04.2025</a:t>
             </a:fld>
             <a:endParaRPr lang="en-US"/>
           </a:p>
@@ -30269,7 +32183,7 @@
           <a:p>
             <a:fld id="{403A2FDA-9B6F-4F19-BB52-15CB2FEB03DD}" type="datetime1">
               <a:rPr lang="de-DE" smtClean="0"/>
-              <a:t>28.04.2025</a:t>
+              <a:t>29.04.2025</a:t>
             </a:fld>
             <a:endParaRPr lang="en-US"/>
           </a:p>
@@ -30817,7 +32731,7 @@
           <a:p>
             <a:fld id="{403A2FDA-9B6F-4F19-BB52-15CB2FEB03DD}" type="datetime1">
               <a:rPr lang="de-DE" smtClean="0"/>
-              <a:t>28.04.2025</a:t>
+              <a:t>29.04.2025</a:t>
             </a:fld>
             <a:endParaRPr lang="en-US"/>
           </a:p>
@@ -31678,7 +33592,7 @@
           <a:p>
             <a:fld id="{B1F82A23-AB26-4EA9-9EE4-DB6F9A4796C6}" type="datetime1">
               <a:rPr lang="de-DE" smtClean="0"/>
-              <a:t>28.04.2025</a:t>
+              <a:t>29.04.2025</a:t>
             </a:fld>
             <a:endParaRPr lang="en-US"/>
           </a:p>
@@ -32205,7 +34119,7 @@
           <a:p>
             <a:fld id="{403A2FDA-9B6F-4F19-BB52-15CB2FEB03DD}" type="datetime1">
               <a:rPr lang="de-DE" smtClean="0"/>
-              <a:t>28.04.2025</a:t>
+              <a:t>29.04.2025</a:t>
             </a:fld>
             <a:endParaRPr lang="en-US"/>
           </a:p>
@@ -32638,7 +34552,7 @@
           <a:p>
             <a:fld id="{B1F82A23-AB26-4EA9-9EE4-DB6F9A4796C6}" type="datetime1">
               <a:rPr lang="de-DE" smtClean="0"/>
-              <a:t>28.04.2025</a:t>
+              <a:t>29.04.2025</a:t>
             </a:fld>
             <a:endParaRPr lang="en-US"/>
           </a:p>

</xml_diff>